<commit_message>
modify oozie feature summary
</commit_message>
<xml_diff>
--- a/oozie-doc/investigate/oozie-feature-summary.pptx
+++ b/oozie-doc/investigate/oozie-feature-summary.pptx
@@ -5,7 +5,7 @@
     <p:sldMasterId id="2147483648" r:id="rId1"/>
   </p:sldMasterIdLst>
   <p:notesMasterIdLst>
-    <p:notesMasterId r:id="rId15"/>
+    <p:notesMasterId r:id="rId16"/>
   </p:notesMasterIdLst>
   <p:sldIdLst>
     <p:sldId id="256" r:id="rId2"/>
@@ -21,6 +21,7 @@
     <p:sldId id="266" r:id="rId12"/>
     <p:sldId id="267" r:id="rId13"/>
     <p:sldId id="268" r:id="rId14"/>
+    <p:sldId id="269" r:id="rId15"/>
   </p:sldIdLst>
   <p:sldSz cx="13004800" cy="9753600"/>
   <p:notesSz cx="6858000" cy="9144000"/>
@@ -12977,8 +12978,8 @@
         </p:nvSpPr>
         <p:spPr>
           <a:xfrm>
-            <a:off x="381000" y="1072901"/>
-            <a:ext cx="12242800" cy="8733137"/>
+            <a:off x="381000" y="1208007"/>
+            <a:ext cx="12847900" cy="9806039"/>
           </a:xfrm>
           <a:prstGeom prst="rect">
             <a:avLst/>
@@ -12989,9 +12990,6 @@
           <a:lstStyle/>
           <a:p>
             <a:pPr lvl="0" defTabSz="457200">
-              <a:lnSpc>
-                <a:spcPts val="4200"/>
-              </a:lnSpc>
               <a:defRPr sz="1800"/>
             </a:pPr>
             <a:r>
@@ -13006,9 +13004,6 @@
           </a:p>
           <a:p>
             <a:pPr lvl="0" defTabSz="457200">
-              <a:lnSpc>
-                <a:spcPts val="4200"/>
-              </a:lnSpc>
               <a:defRPr sz="1800"/>
             </a:pPr>
             <a:r>
@@ -13023,9 +13018,6 @@
           </a:p>
           <a:p>
             <a:pPr lvl="0" defTabSz="457200">
-              <a:lnSpc>
-                <a:spcPts val="4200"/>
-              </a:lnSpc>
               <a:defRPr sz="1800"/>
             </a:pPr>
             <a:r>
@@ -13040,9 +13032,6 @@
           </a:p>
           <a:p>
             <a:pPr lvl="0" defTabSz="457200">
-              <a:lnSpc>
-                <a:spcPts val="4200"/>
-              </a:lnSpc>
               <a:defRPr sz="1800"/>
             </a:pPr>
             <a:r>
@@ -13057,9 +13046,6 @@
           </a:p>
           <a:p>
             <a:pPr lvl="0" defTabSz="457200">
-              <a:lnSpc>
-                <a:spcPts val="4200"/>
-              </a:lnSpc>
               <a:defRPr sz="1800"/>
             </a:pPr>
             <a:r>
@@ -13083,9 +13069,6 @@
           </a:p>
           <a:p>
             <a:pPr lvl="0" defTabSz="457200">
-              <a:lnSpc>
-                <a:spcPts val="4200"/>
-              </a:lnSpc>
               <a:defRPr sz="1800"/>
             </a:pPr>
             <a:r>
@@ -13142,9 +13125,6 @@
           </a:p>
           <a:p>
             <a:pPr lvl="0" defTabSz="457200">
-              <a:lnSpc>
-                <a:spcPts val="4200"/>
-              </a:lnSpc>
               <a:defRPr sz="1800"/>
             </a:pPr>
             <a:r>
@@ -14689,6 +14669,478 @@
 </p:sld>
 </file>
 
+<file path=ppt/slides/slide14.xml><?xml version="1.0" encoding="utf-8"?>
+<p:sld xmlns:a="http://schemas.openxmlformats.org/drawingml/2006/main" xmlns:r="http://schemas.openxmlformats.org/officeDocument/2006/relationships" xmlns:p="http://schemas.openxmlformats.org/presentationml/2006/main">
+  <p:cSld>
+    <p:spTree>
+      <p:nvGrpSpPr>
+        <p:cNvPr id="1" name=""/>
+        <p:cNvGrpSpPr/>
+        <p:nvPr/>
+      </p:nvGrpSpPr>
+      <p:grpSpPr>
+        <a:xfrm>
+          <a:off x="0" y="0"/>
+          <a:ext cx="0" cy="0"/>
+          <a:chOff x="0" y="0"/>
+          <a:chExt cx="0" cy="0"/>
+        </a:xfrm>
+      </p:grpSpPr>
+      <p:sp>
+        <p:nvSpPr>
+          <p:cNvPr id="310" name="Shape 310"/>
+          <p:cNvSpPr>
+            <a:spLocks noGrp="1"/>
+          </p:cNvSpPr>
+          <p:nvPr>
+            <p:ph type="title"/>
+          </p:nvPr>
+        </p:nvSpPr>
+        <p:spPr>
+          <a:prstGeom prst="rect">
+            <a:avLst/>
+          </a:prstGeom>
+        </p:spPr>
+        <p:txBody>
+          <a:bodyPr/>
+          <a:lstStyle/>
+          <a:p>
+            <a:pPr lvl="0">
+              <a:defRPr sz="1800" b="0" cap="none" spc="0">
+                <a:solidFill>
+                  <a:srgbClr val="000000"/>
+                </a:solidFill>
+              </a:defRPr>
+            </a:pPr>
+            <a:r>
+              <a:rPr lang="en-US" sz="3600" b="1" cap="all" spc="-144" dirty="0" err="1" smtClean="0">
+                <a:solidFill>
+                  <a:srgbClr val="00B56E"/>
+                </a:solidFill>
+              </a:rPr>
+              <a:t>W</a:t>
+            </a:r>
+            <a:r>
+              <a:rPr sz="3600" b="1" cap="all" spc="-144" dirty="0" err="1" smtClean="0">
+                <a:solidFill>
+                  <a:srgbClr val="00B56E"/>
+                </a:solidFill>
+              </a:rPr>
+              <a:t>orkflow的</a:t>
+            </a:r>
+            <a:r>
+              <a:rPr lang="zh-CN" altLang="en-US" sz="3600" b="1" cap="all" spc="-144" dirty="0" smtClean="0">
+                <a:solidFill>
+                  <a:srgbClr val="00B56E"/>
+                </a:solidFill>
+              </a:rPr>
+              <a:t>热部署特性</a:t>
+            </a:r>
+            <a:endParaRPr sz="3600" b="1" cap="all" spc="-144" dirty="0">
+              <a:solidFill>
+                <a:srgbClr val="00B56E"/>
+              </a:solidFill>
+            </a:endParaRPr>
+          </a:p>
+        </p:txBody>
+      </p:sp>
+      <p:sp>
+        <p:nvSpPr>
+          <p:cNvPr id="311" name="Shape 311"/>
+          <p:cNvSpPr>
+            <a:spLocks noGrp="1"/>
+          </p:cNvSpPr>
+          <p:nvPr>
+            <p:ph type="body" idx="1"/>
+          </p:nvPr>
+        </p:nvSpPr>
+        <p:spPr>
+          <a:xfrm>
+            <a:off x="381000" y="1187231"/>
+            <a:ext cx="12242800" cy="8733137"/>
+          </a:xfrm>
+          <a:prstGeom prst="rect">
+            <a:avLst/>
+          </a:prstGeom>
+        </p:spPr>
+        <p:txBody>
+          <a:bodyPr/>
+          <a:lstStyle/>
+          <a:p>
+            <a:pPr lvl="0" defTabSz="457200">
+              <a:lnSpc>
+                <a:spcPct val="150000"/>
+              </a:lnSpc>
+              <a:spcBef>
+                <a:spcPts val="0"/>
+              </a:spcBef>
+              <a:tabLst>
+                <a:tab pos="355600" algn="l"/>
+                <a:tab pos="711200" algn="l"/>
+                <a:tab pos="1066800" algn="l"/>
+                <a:tab pos="1422400" algn="l"/>
+                <a:tab pos="1778000" algn="l"/>
+                <a:tab pos="2133600" algn="l"/>
+                <a:tab pos="2489200" algn="l"/>
+                <a:tab pos="2844800" algn="l"/>
+                <a:tab pos="3200400" algn="l"/>
+                <a:tab pos="3556000" algn="l"/>
+                <a:tab pos="3911600" algn="l"/>
+                <a:tab pos="4267200" algn="l"/>
+              </a:tabLst>
+              <a:defRPr sz="1800"/>
+            </a:pPr>
+            <a:r>
+              <a:rPr lang="zh-CN" altLang="en-US" sz="2400" dirty="0" smtClean="0">
+                <a:latin typeface="PingFang SC Regular"/>
+                <a:ea typeface="PingFang SC Regular"/>
+                <a:cs typeface="PingFang SC Regular"/>
+                <a:sym typeface="PingFang SC Regular"/>
+              </a:rPr>
+              <a:t>假设</a:t>
+            </a:r>
+            <a:r>
+              <a:rPr lang="en-US" altLang="zh-CN" sz="2400" dirty="0" smtClean="0">
+                <a:latin typeface="PingFang SC Regular"/>
+                <a:ea typeface="PingFang SC Regular"/>
+                <a:cs typeface="PingFang SC Regular"/>
+                <a:sym typeface="PingFang SC Regular"/>
+              </a:rPr>
+              <a:t>workflow</a:t>
+            </a:r>
+            <a:r>
+              <a:rPr lang="zh-CN" altLang="en-US" sz="2400" dirty="0" smtClean="0">
+                <a:latin typeface="PingFang SC Regular"/>
+                <a:ea typeface="PingFang SC Regular"/>
+                <a:cs typeface="PingFang SC Regular"/>
+                <a:sym typeface="PingFang SC Regular"/>
+              </a:rPr>
+              <a:t>的运行频率是每小时运行一次，整点运行，</a:t>
+            </a:r>
+            <a:r>
+              <a:rPr lang="en-US" altLang="zh-CN" sz="2400" dirty="0" smtClean="0">
+                <a:latin typeface="PingFang SC Regular"/>
+                <a:ea typeface="PingFang SC Regular"/>
+                <a:cs typeface="PingFang SC Regular"/>
+                <a:sym typeface="PingFang SC Regular"/>
+              </a:rPr>
+              <a:t>1:00</a:t>
+            </a:r>
+            <a:r>
+              <a:rPr lang="zh-CN" altLang="en-US" sz="2400" dirty="0" smtClean="0">
+                <a:latin typeface="PingFang SC Regular"/>
+                <a:ea typeface="PingFang SC Regular"/>
+                <a:cs typeface="PingFang SC Regular"/>
+                <a:sym typeface="PingFang SC Regular"/>
+              </a:rPr>
+              <a:t>，</a:t>
+            </a:r>
+            <a:r>
+              <a:rPr lang="en-US" altLang="zh-CN" sz="2400" dirty="0" smtClean="0">
+                <a:latin typeface="PingFang SC Regular"/>
+                <a:ea typeface="PingFang SC Regular"/>
+                <a:cs typeface="PingFang SC Regular"/>
+                <a:sym typeface="PingFang SC Regular"/>
+              </a:rPr>
+              <a:t>2:00</a:t>
+            </a:r>
+            <a:r>
+              <a:rPr lang="zh-CN" altLang="en-US" sz="2400" dirty="0" smtClean="0">
+                <a:latin typeface="PingFang SC Regular"/>
+                <a:ea typeface="PingFang SC Regular"/>
+                <a:cs typeface="PingFang SC Regular"/>
+                <a:sym typeface="PingFang SC Regular"/>
+              </a:rPr>
+              <a:t>，</a:t>
+            </a:r>
+            <a:r>
+              <a:rPr lang="en-US" altLang="zh-CN" sz="2400" dirty="0" smtClean="0">
+                <a:latin typeface="PingFang SC Regular"/>
+                <a:ea typeface="PingFang SC Regular"/>
+                <a:cs typeface="PingFang SC Regular"/>
+                <a:sym typeface="PingFang SC Regular"/>
+              </a:rPr>
+              <a:t>3</a:t>
+            </a:r>
+            <a:r>
+              <a:rPr lang="zh-CN" altLang="en-US" sz="2400" dirty="0" smtClean="0">
+                <a:latin typeface="PingFang SC Regular"/>
+                <a:ea typeface="PingFang SC Regular"/>
+                <a:cs typeface="PingFang SC Regular"/>
+                <a:sym typeface="PingFang SC Regular"/>
+              </a:rPr>
+              <a:t>：</a:t>
+            </a:r>
+            <a:r>
+              <a:rPr lang="en-US" altLang="zh-CN" sz="2400" dirty="0" smtClean="0">
+                <a:latin typeface="PingFang SC Regular"/>
+                <a:ea typeface="PingFang SC Regular"/>
+                <a:cs typeface="PingFang SC Regular"/>
+                <a:sym typeface="PingFang SC Regular"/>
+              </a:rPr>
+              <a:t>00</a:t>
+            </a:r>
+            <a:r>
+              <a:rPr lang="zh-CN" altLang="en-US" sz="2400" dirty="0" smtClean="0">
+                <a:latin typeface="PingFang SC Regular"/>
+                <a:ea typeface="PingFang SC Regular"/>
+                <a:cs typeface="PingFang SC Regular"/>
+                <a:sym typeface="PingFang SC Regular"/>
+              </a:rPr>
+              <a:t>。</a:t>
+            </a:r>
+            <a:endParaRPr lang="en-US" altLang="zh-CN" sz="2400" dirty="0" smtClean="0">
+              <a:latin typeface="PingFang SC Regular"/>
+              <a:ea typeface="PingFang SC Regular"/>
+              <a:cs typeface="PingFang SC Regular"/>
+              <a:sym typeface="PingFang SC Regular"/>
+            </a:endParaRPr>
+          </a:p>
+          <a:p>
+            <a:pPr lvl="0" defTabSz="457200">
+              <a:lnSpc>
+                <a:spcPct val="150000"/>
+              </a:lnSpc>
+              <a:spcBef>
+                <a:spcPts val="0"/>
+              </a:spcBef>
+              <a:tabLst>
+                <a:tab pos="355600" algn="l"/>
+                <a:tab pos="711200" algn="l"/>
+                <a:tab pos="1066800" algn="l"/>
+                <a:tab pos="1422400" algn="l"/>
+                <a:tab pos="1778000" algn="l"/>
+                <a:tab pos="2133600" algn="l"/>
+                <a:tab pos="2489200" algn="l"/>
+                <a:tab pos="2844800" algn="l"/>
+                <a:tab pos="3200400" algn="l"/>
+                <a:tab pos="3556000" algn="l"/>
+                <a:tab pos="3911600" algn="l"/>
+                <a:tab pos="4267200" algn="l"/>
+              </a:tabLst>
+              <a:defRPr sz="1800"/>
+            </a:pPr>
+            <a:r>
+              <a:rPr lang="zh-CN" altLang="en-US" sz="2400" dirty="0" smtClean="0">
+                <a:latin typeface="PingFang SC Regular"/>
+                <a:ea typeface="PingFang SC Regular"/>
+                <a:cs typeface="PingFang SC Regular"/>
+                <a:sym typeface="PingFang SC Regular"/>
+              </a:rPr>
+              <a:t>假设当前是</a:t>
+            </a:r>
+            <a:r>
+              <a:rPr lang="en-US" altLang="zh-CN" sz="2400" dirty="0" smtClean="0">
+                <a:latin typeface="PingFang SC Regular"/>
+                <a:ea typeface="PingFang SC Regular"/>
+                <a:cs typeface="PingFang SC Regular"/>
+                <a:sym typeface="PingFang SC Regular"/>
+              </a:rPr>
+              <a:t>1:30</a:t>
+            </a:r>
+            <a:r>
+              <a:rPr lang="zh-CN" altLang="en-US" sz="2400" dirty="0" smtClean="0">
+                <a:latin typeface="PingFang SC Regular"/>
+                <a:ea typeface="PingFang SC Regular"/>
+                <a:cs typeface="PingFang SC Regular"/>
+                <a:sym typeface="PingFang SC Regular"/>
+              </a:rPr>
+              <a:t>，此时</a:t>
+            </a:r>
+            <a:r>
+              <a:rPr lang="zh-CN" altLang="en-US" sz="2400" dirty="0" smtClean="0">
+                <a:latin typeface="PingFang SC Regular"/>
+                <a:ea typeface="PingFang SC Regular"/>
+                <a:cs typeface="PingFang SC Regular"/>
+                <a:sym typeface="PingFang SC Regular"/>
+              </a:rPr>
+              <a:t>可以编辑</a:t>
+            </a:r>
+            <a:r>
+              <a:rPr lang="en-US" altLang="zh-CN" sz="2400" dirty="0" err="1" smtClean="0">
+                <a:latin typeface="PingFang SC Regular"/>
+                <a:ea typeface="PingFang SC Regular"/>
+                <a:cs typeface="PingFang SC Regular"/>
+                <a:sym typeface="PingFang SC Regular"/>
+              </a:rPr>
+              <a:t>workflow.xml</a:t>
+            </a:r>
+            <a:r>
+              <a:rPr lang="zh-CN" altLang="en-US" sz="2400" dirty="0" smtClean="0">
+                <a:latin typeface="PingFang SC Regular"/>
+                <a:ea typeface="PingFang SC Regular"/>
+                <a:cs typeface="PingFang SC Regular"/>
+                <a:sym typeface="PingFang SC Regular"/>
+              </a:rPr>
+              <a:t>文件，增加，删除，修改</a:t>
+            </a:r>
+            <a:r>
+              <a:rPr lang="en-US" altLang="zh-CN" sz="2400" dirty="0" smtClean="0">
+                <a:latin typeface="PingFang SC Regular"/>
+                <a:ea typeface="PingFang SC Regular"/>
+                <a:cs typeface="PingFang SC Regular"/>
+                <a:sym typeface="PingFang SC Regular"/>
+              </a:rPr>
+              <a:t>action</a:t>
+            </a:r>
+            <a:r>
+              <a:rPr lang="zh-CN" altLang="en-US" sz="2400" dirty="0" smtClean="0">
+                <a:latin typeface="PingFang SC Regular"/>
+                <a:ea typeface="PingFang SC Regular"/>
+                <a:cs typeface="PingFang SC Regular"/>
+                <a:sym typeface="PingFang SC Regular"/>
+              </a:rPr>
+              <a:t>节点，修改完成之后可以将原来的</a:t>
+            </a:r>
+            <a:r>
+              <a:rPr lang="en-US" altLang="zh-CN" sz="2400" dirty="0" err="1" smtClean="0">
+                <a:latin typeface="PingFang SC Regular"/>
+                <a:ea typeface="PingFang SC Regular"/>
+                <a:cs typeface="PingFang SC Regular"/>
+                <a:sym typeface="PingFang SC Regular"/>
+              </a:rPr>
+              <a:t>workflow.xml</a:t>
+            </a:r>
+            <a:r>
+              <a:rPr lang="zh-CN" altLang="en-US" sz="2400" dirty="0" smtClean="0">
+                <a:latin typeface="PingFang SC Regular"/>
+                <a:ea typeface="PingFang SC Regular"/>
+                <a:cs typeface="PingFang SC Regular"/>
+                <a:sym typeface="PingFang SC Regular"/>
+              </a:rPr>
+              <a:t>替换，在下一个时刻，</a:t>
+            </a:r>
+            <a:r>
+              <a:rPr lang="en-US" altLang="zh-CN" sz="2400" dirty="0" smtClean="0">
+                <a:latin typeface="PingFang SC Regular"/>
+                <a:ea typeface="PingFang SC Regular"/>
+                <a:cs typeface="PingFang SC Regular"/>
+                <a:sym typeface="PingFang SC Regular"/>
+              </a:rPr>
+              <a:t>workflow</a:t>
+            </a:r>
+            <a:r>
+              <a:rPr lang="zh-CN" altLang="en-US" sz="2400" dirty="0" smtClean="0">
+                <a:latin typeface="PingFang SC Regular"/>
+                <a:ea typeface="PingFang SC Regular"/>
+                <a:cs typeface="PingFang SC Regular"/>
+                <a:sym typeface="PingFang SC Regular"/>
+              </a:rPr>
+              <a:t>会启用新的</a:t>
+            </a:r>
+            <a:r>
+              <a:rPr lang="en-US" altLang="zh-CN" sz="2400" dirty="0" err="1" smtClean="0">
+                <a:latin typeface="PingFang SC Regular"/>
+                <a:ea typeface="PingFang SC Regular"/>
+                <a:cs typeface="PingFang SC Regular"/>
+                <a:sym typeface="PingFang SC Regular"/>
+              </a:rPr>
+              <a:t>workflow.xml</a:t>
+            </a:r>
+            <a:r>
+              <a:rPr lang="zh-CN" altLang="en-US" sz="2400" dirty="0" smtClean="0">
+                <a:latin typeface="PingFang SC Regular"/>
+                <a:ea typeface="PingFang SC Regular"/>
+                <a:cs typeface="PingFang SC Regular"/>
+                <a:sym typeface="PingFang SC Regular"/>
+              </a:rPr>
+              <a:t>，不需要挂起整个</a:t>
+            </a:r>
+            <a:r>
+              <a:rPr lang="en-US" altLang="zh-CN" sz="2400" dirty="0" err="1" smtClean="0">
+                <a:latin typeface="PingFang SC Regular"/>
+                <a:ea typeface="PingFang SC Regular"/>
+                <a:cs typeface="PingFang SC Regular"/>
+                <a:sym typeface="PingFang SC Regular"/>
+              </a:rPr>
+              <a:t>workflow.xml</a:t>
+            </a:r>
+            <a:r>
+              <a:rPr lang="zh-CN" altLang="en-US" sz="2400" dirty="0" smtClean="0">
+                <a:latin typeface="PingFang SC Regular"/>
+                <a:ea typeface="PingFang SC Regular"/>
+                <a:cs typeface="PingFang SC Regular"/>
+                <a:sym typeface="PingFang SC Regular"/>
+              </a:rPr>
+              <a:t>应用</a:t>
+            </a:r>
+            <a:endParaRPr sz="2400" dirty="0">
+              <a:latin typeface="PingFang SC Regular"/>
+              <a:ea typeface="PingFang SC Regular"/>
+              <a:cs typeface="PingFang SC Regular"/>
+              <a:sym typeface="PingFang SC Regular"/>
+            </a:endParaRPr>
+          </a:p>
+        </p:txBody>
+      </p:sp>
+      <p:sp>
+        <p:nvSpPr>
+          <p:cNvPr id="313" name="Shape 313"/>
+          <p:cNvSpPr>
+            <a:spLocks noGrp="1"/>
+          </p:cNvSpPr>
+          <p:nvPr>
+            <p:ph type="sldNum" sz="quarter" idx="2"/>
+          </p:nvPr>
+        </p:nvSpPr>
+        <p:spPr>
+          <a:prstGeom prst="rect">
+            <a:avLst/>
+          </a:prstGeom>
+          <a:extLst>
+            <a:ext uri="{C572A759-6A51-4108-AA02-DFA0A04FC94B}">
+              <ma14:wrappingTextBoxFlag xmlns:ma14="http://schemas.microsoft.com/office/mac/drawingml/2011/main" val="1"/>
+            </a:ext>
+          </a:extLst>
+        </p:spPr>
+        <p:txBody>
+          <a:bodyPr/>
+          <a:lstStyle/>
+          <a:p>
+            <a:pPr lvl="0">
+              <a:defRPr sz="1800" i="0">
+                <a:solidFill>
+                  <a:srgbClr val="000000"/>
+                </a:solidFill>
+              </a:defRPr>
+            </a:pPr>
+            <a:fld id="{86CB4B4D-7CA3-9044-876B-883B54F8677D}" type="slidenum">
+              <a:rPr sz="1100" i="1">
+                <a:solidFill>
+                  <a:srgbClr val="929396"/>
+                </a:solidFill>
+              </a:rPr>
+              <a:t>14</a:t>
+            </a:fld>
+            <a:endParaRPr sz="1100" i="1">
+              <a:solidFill>
+                <a:srgbClr val="929396"/>
+              </a:solidFill>
+            </a:endParaRPr>
+          </a:p>
+        </p:txBody>
+      </p:sp>
+    </p:spTree>
+    <p:extLst>
+      <p:ext uri="{BB962C8B-B14F-4D97-AF65-F5344CB8AC3E}">
+        <p14:creationId xmlns:p14="http://schemas.microsoft.com/office/powerpoint/2010/main" val="3779239959"/>
+      </p:ext>
+    </p:extLst>
+  </p:cSld>
+  <p:clrMapOvr>
+    <a:masterClrMapping/>
+  </p:clrMapOvr>
+  <p:transition xmlns:p14="http://schemas.microsoft.com/office/powerpoint/2010/main" spd="med"/>
+  <p:timing>
+    <p:tnLst>
+      <p:par>
+        <p:cTn xmlns:p14="http://schemas.microsoft.com/office/powerpoint/2010/main" id="1" dur="indefinite" restart="never" nodeType="tmRoot"/>
+      </p:par>
+    </p:tnLst>
+  </p:timing>
+</p:sld>
+</file>
+
 <file path=ppt/slides/slide2.xml><?xml version="1.0" encoding="utf-8"?>
 <p:sld xmlns:a="http://schemas.openxmlformats.org/drawingml/2006/main" xmlns:r="http://schemas.openxmlformats.org/officeDocument/2006/relationships" xmlns:p="http://schemas.openxmlformats.org/presentationml/2006/main">
   <p:cSld>
@@ -15003,8 +15455,73 @@
                 </a:solidFill>
                 <a:hlinkClick r:id="rId8" action="ppaction://hlinksldjump"/>
               </a:rPr>
-              <a:t>workflow的一个action节点失败后的是否忽略本节点错误</a:t>
-            </a:r>
+              <a:t>workflow的一个action节点失败后的是否忽略本节点</a:t>
+            </a:r>
+            <a:r>
+              <a:rPr sz="2000" dirty="0" smtClean="0">
+                <a:solidFill>
+                  <a:srgbClr val="00B56E"/>
+                </a:solidFill>
+                <a:hlinkClick r:id="rId8" action="ppaction://hlinksldjump"/>
+              </a:rPr>
+              <a:t>错误</a:t>
+            </a:r>
+            <a:endParaRPr lang="en-US" sz="2000" dirty="0" smtClean="0">
+              <a:solidFill>
+                <a:srgbClr val="00B56E"/>
+              </a:solidFill>
+            </a:endParaRPr>
+          </a:p>
+          <a:p>
+            <a:pPr>
+              <a:defRPr sz="1800"/>
+            </a:pPr>
+            <a:r>
+              <a:rPr lang="en-US" altLang="zh-TW" sz="2000" dirty="0">
+                <a:solidFill>
+                  <a:srgbClr val="00B56E"/>
+                </a:solidFill>
+              </a:rPr>
+              <a:t>•    </a:t>
+            </a:r>
+            <a:r>
+              <a:rPr lang="en-US" altLang="zh-TW" sz="2000" dirty="0" smtClean="0">
+                <a:solidFill>
+                  <a:srgbClr val="00B56E"/>
+                </a:solidFill>
+                <a:hlinkClick r:id="rId9" action="ppaction://hlinksldjump"/>
+              </a:rPr>
+              <a:t>workflow</a:t>
+            </a:r>
+            <a:r>
+              <a:rPr lang="zh-CN" altLang="en-US" sz="2000" dirty="0" smtClean="0">
+                <a:solidFill>
+                  <a:srgbClr val="00B56E"/>
+                </a:solidFill>
+                <a:hlinkClick r:id="rId9" action="ppaction://hlinksldjump"/>
+              </a:rPr>
+              <a:t>的热部署特性</a:t>
+            </a:r>
+            <a:endParaRPr lang="zh-TW" altLang="en-US" sz="2000" dirty="0">
+              <a:solidFill>
+                <a:srgbClr val="00B56E"/>
+              </a:solidFill>
+            </a:endParaRPr>
+          </a:p>
+          <a:p>
+            <a:pPr lvl="0">
+              <a:defRPr sz="1800"/>
+            </a:pPr>
+            <a:endParaRPr lang="en-US" sz="2000" dirty="0" smtClean="0">
+              <a:solidFill>
+                <a:srgbClr val="00B56E"/>
+              </a:solidFill>
+            </a:endParaRPr>
+          </a:p>
+          <a:p>
+            <a:pPr lvl="0">
+              <a:defRPr sz="1800"/>
+            </a:pPr>
             <a:endParaRPr sz="2000" dirty="0">
               <a:solidFill>
                 <a:srgbClr val="00B56E"/>

</xml_diff>

<commit_message>
modify oozie summray ppt
</commit_message>
<xml_diff>
--- a/oozie-doc/investigate/oozie-feature-summary.pptx
+++ b/oozie-doc/investigate/oozie-feature-summary.pptx
@@ -5,7 +5,7 @@
     <p:sldMasterId id="2147483648" r:id="rId1"/>
   </p:sldMasterIdLst>
   <p:notesMasterIdLst>
-    <p:notesMasterId r:id="rId16"/>
+    <p:notesMasterId r:id="rId17"/>
   </p:notesMasterIdLst>
   <p:sldIdLst>
     <p:sldId id="256" r:id="rId2"/>
@@ -22,6 +22,7 @@
     <p:sldId id="267" r:id="rId13"/>
     <p:sldId id="268" r:id="rId14"/>
     <p:sldId id="269" r:id="rId15"/>
+    <p:sldId id="270" r:id="rId16"/>
   </p:sldIdLst>
   <p:sldSz cx="13004800" cy="9753600"/>
   <p:notesSz cx="6858000" cy="9144000"/>
@@ -12426,8 +12427,8 @@
         </p:nvSpPr>
         <p:spPr>
           <a:xfrm>
-            <a:off x="402685" y="6921499"/>
-            <a:ext cx="12422077" cy="1016001"/>
+            <a:off x="402685" y="6800481"/>
+            <a:ext cx="12530561" cy="1258037"/>
           </a:xfrm>
           <a:prstGeom prst="rect">
             <a:avLst/>
@@ -12449,12 +12450,12 @@
           <a:p>
             <a:pPr lvl="0" algn="l" defTabSz="914400">
               <a:lnSpc>
-                <a:spcPct val="100000"/>
+                <a:spcPct val="150000"/>
               </a:lnSpc>
               <a:defRPr sz="1800" i="0"/>
             </a:pPr>
             <a:r>
-              <a:rPr sz="1700">
+              <a:rPr sz="1700" dirty="0">
                 <a:latin typeface="+mn-lt"/>
                 <a:ea typeface="+mn-ea"/>
                 <a:cs typeface="+mn-cs"/>
@@ -12466,12 +12467,12 @@
           <a:p>
             <a:pPr lvl="0" algn="l" defTabSz="914400">
               <a:lnSpc>
-                <a:spcPct val="100000"/>
+                <a:spcPct val="150000"/>
               </a:lnSpc>
               <a:defRPr sz="1800" i="0"/>
             </a:pPr>
             <a:r>
-              <a:rPr sz="1700">
+              <a:rPr sz="1700" dirty="0">
                 <a:latin typeface="+mn-lt"/>
                 <a:ea typeface="+mn-ea"/>
                 <a:cs typeface="+mn-cs"/>
@@ -12483,12 +12484,12 @@
           <a:p>
             <a:pPr lvl="0" algn="l" defTabSz="914400">
               <a:lnSpc>
-                <a:spcPct val="100000"/>
+                <a:spcPct val="150000"/>
               </a:lnSpc>
               <a:defRPr sz="1800" i="0"/>
             </a:pPr>
             <a:r>
-              <a:rPr sz="1700">
+              <a:rPr sz="1700" dirty="0">
                 <a:latin typeface="+mn-lt"/>
                 <a:ea typeface="+mn-ea"/>
                 <a:cs typeface="+mn-cs"/>
@@ -14791,103 +14792,31 @@
               <a:defRPr sz="1800"/>
             </a:pPr>
             <a:r>
+              <a:rPr lang="en-US" altLang="zh-CN" sz="2400" dirty="0" smtClean="0">
+                <a:latin typeface="PingFang SC Regular"/>
+                <a:ea typeface="PingFang SC Regular"/>
+                <a:cs typeface="PingFang SC Regular"/>
+                <a:sym typeface="PingFang SC Regular"/>
+              </a:rPr>
+              <a:t>1. </a:t>
+            </a:r>
+            <a:r>
               <a:rPr lang="zh-CN" altLang="en-US" sz="2400" dirty="0" smtClean="0">
                 <a:latin typeface="PingFang SC Regular"/>
                 <a:ea typeface="PingFang SC Regular"/>
                 <a:cs typeface="PingFang SC Regular"/>
                 <a:sym typeface="PingFang SC Regular"/>
               </a:rPr>
-              <a:t>假设</a:t>
-            </a:r>
-            <a:r>
-              <a:rPr lang="en-US" altLang="zh-CN" sz="2400" dirty="0" smtClean="0">
+              <a:t>动态修改</a:t>
+            </a:r>
+            <a:r>
+              <a:rPr lang="en-US" altLang="zh-CN" sz="2400" dirty="0" err="1" smtClean="0">
                 <a:latin typeface="PingFang SC Regular"/>
                 <a:ea typeface="PingFang SC Regular"/>
                 <a:cs typeface="PingFang SC Regular"/>
                 <a:sym typeface="PingFang SC Regular"/>
               </a:rPr>
-              <a:t>workflow</a:t>
-            </a:r>
-            <a:r>
-              <a:rPr lang="zh-CN" altLang="en-US" sz="2400" dirty="0" smtClean="0">
-                <a:latin typeface="PingFang SC Regular"/>
-                <a:ea typeface="PingFang SC Regular"/>
-                <a:cs typeface="PingFang SC Regular"/>
-                <a:sym typeface="PingFang SC Regular"/>
-              </a:rPr>
-              <a:t>的运行频率是每小时运行一次，整点运行，</a:t>
-            </a:r>
-            <a:r>
-              <a:rPr lang="en-US" altLang="zh-CN" sz="2400" dirty="0" smtClean="0">
-                <a:latin typeface="PingFang SC Regular"/>
-                <a:ea typeface="PingFang SC Regular"/>
-                <a:cs typeface="PingFang SC Regular"/>
-                <a:sym typeface="PingFang SC Regular"/>
-              </a:rPr>
-              <a:t>1:00</a:t>
-            </a:r>
-            <a:r>
-              <a:rPr lang="zh-CN" altLang="en-US" sz="2400" dirty="0" smtClean="0">
-                <a:latin typeface="PingFang SC Regular"/>
-                <a:ea typeface="PingFang SC Regular"/>
-                <a:cs typeface="PingFang SC Regular"/>
-                <a:sym typeface="PingFang SC Regular"/>
-              </a:rPr>
-              <a:t>，</a:t>
-            </a:r>
-            <a:r>
-              <a:rPr lang="en-US" altLang="zh-CN" sz="2400" dirty="0" smtClean="0">
-                <a:latin typeface="PingFang SC Regular"/>
-                <a:ea typeface="PingFang SC Regular"/>
-                <a:cs typeface="PingFang SC Regular"/>
-                <a:sym typeface="PingFang SC Regular"/>
-              </a:rPr>
-              <a:t>2:00</a:t>
-            </a:r>
-            <a:r>
-              <a:rPr lang="zh-CN" altLang="en-US" sz="2400" dirty="0" smtClean="0">
-                <a:latin typeface="PingFang SC Regular"/>
-                <a:ea typeface="PingFang SC Regular"/>
-                <a:cs typeface="PingFang SC Regular"/>
-                <a:sym typeface="PingFang SC Regular"/>
-              </a:rPr>
-              <a:t>，</a:t>
-            </a:r>
-            <a:r>
-              <a:rPr lang="en-US" altLang="zh-CN" sz="2400" dirty="0" smtClean="0">
-                <a:latin typeface="PingFang SC Regular"/>
-                <a:ea typeface="PingFang SC Regular"/>
-                <a:cs typeface="PingFang SC Regular"/>
-                <a:sym typeface="PingFang SC Regular"/>
-              </a:rPr>
-              <a:t>3</a:t>
-            </a:r>
-            <a:r>
-              <a:rPr lang="zh-CN" altLang="en-US" sz="2400" dirty="0" smtClean="0">
-                <a:latin typeface="PingFang SC Regular"/>
-                <a:ea typeface="PingFang SC Regular"/>
-                <a:cs typeface="PingFang SC Regular"/>
-                <a:sym typeface="PingFang SC Regular"/>
-              </a:rPr>
-              <a:t>：</a:t>
-            </a:r>
-            <a:r>
-              <a:rPr lang="en-US" altLang="zh-CN" sz="2400" dirty="0" smtClean="0">
-                <a:latin typeface="PingFang SC Regular"/>
-                <a:ea typeface="PingFang SC Regular"/>
-                <a:cs typeface="PingFang SC Regular"/>
-                <a:sym typeface="PingFang SC Regular"/>
-              </a:rPr>
-              <a:t>00</a:t>
-            </a:r>
-            <a:r>
-              <a:rPr lang="zh-CN" altLang="en-US" sz="2400" dirty="0" smtClean="0">
-                <a:latin typeface="PingFang SC Regular"/>
-                <a:ea typeface="PingFang SC Regular"/>
-                <a:cs typeface="PingFang SC Regular"/>
-                <a:sym typeface="PingFang SC Regular"/>
-              </a:rPr>
-              <a:t>。</a:t>
+              <a:t>workflow.xml</a:t>
             </a:r>
             <a:endParaRPr lang="en-US" altLang="zh-CN" sz="2400" dirty="0" smtClean="0">
               <a:latin typeface="PingFang SC Regular"/>
@@ -14927,7 +14856,7 @@
                 <a:cs typeface="PingFang SC Regular"/>
                 <a:sym typeface="PingFang SC Regular"/>
               </a:rPr>
-              <a:t>假设当前是</a:t>
+              <a:t>假设</a:t>
             </a:r>
             <a:r>
               <a:rPr lang="en-US" altLang="zh-CN" sz="2400" dirty="0" smtClean="0">
@@ -14936,7 +14865,7 @@
                 <a:cs typeface="PingFang SC Regular"/>
                 <a:sym typeface="PingFang SC Regular"/>
               </a:rPr>
-              <a:t>1:30</a:t>
+              <a:t>workflow</a:t>
             </a:r>
             <a:r>
               <a:rPr lang="zh-CN" altLang="en-US" sz="2400" dirty="0" smtClean="0">
@@ -14945,7 +14874,16 @@
                 <a:cs typeface="PingFang SC Regular"/>
                 <a:sym typeface="PingFang SC Regular"/>
               </a:rPr>
-              <a:t>，此时</a:t>
+              <a:t>的运行频率是每小时运行一次，整点运行，</a:t>
+            </a:r>
+            <a:r>
+              <a:rPr lang="en-US" altLang="zh-CN" sz="2400" dirty="0" smtClean="0">
+                <a:latin typeface="PingFang SC Regular"/>
+                <a:ea typeface="PingFang SC Regular"/>
+                <a:cs typeface="PingFang SC Regular"/>
+                <a:sym typeface="PingFang SC Regular"/>
+              </a:rPr>
+              <a:t>1:00</a:t>
             </a:r>
             <a:r>
               <a:rPr lang="zh-CN" altLang="en-US" sz="2400" dirty="0" smtClean="0">
@@ -14954,6 +14892,127 @@
                 <a:cs typeface="PingFang SC Regular"/>
                 <a:sym typeface="PingFang SC Regular"/>
               </a:rPr>
+              <a:t>，</a:t>
+            </a:r>
+            <a:r>
+              <a:rPr lang="en-US" altLang="zh-CN" sz="2400" dirty="0" smtClean="0">
+                <a:latin typeface="PingFang SC Regular"/>
+                <a:ea typeface="PingFang SC Regular"/>
+                <a:cs typeface="PingFang SC Regular"/>
+                <a:sym typeface="PingFang SC Regular"/>
+              </a:rPr>
+              <a:t>2:00</a:t>
+            </a:r>
+            <a:r>
+              <a:rPr lang="zh-CN" altLang="en-US" sz="2400" dirty="0" smtClean="0">
+                <a:latin typeface="PingFang SC Regular"/>
+                <a:ea typeface="PingFang SC Regular"/>
+                <a:cs typeface="PingFang SC Regular"/>
+                <a:sym typeface="PingFang SC Regular"/>
+              </a:rPr>
+              <a:t>，</a:t>
+            </a:r>
+            <a:r>
+              <a:rPr lang="en-US" altLang="zh-CN" sz="2400" dirty="0" smtClean="0">
+                <a:latin typeface="PingFang SC Regular"/>
+                <a:ea typeface="PingFang SC Regular"/>
+                <a:cs typeface="PingFang SC Regular"/>
+                <a:sym typeface="PingFang SC Regular"/>
+              </a:rPr>
+              <a:t>3</a:t>
+            </a:r>
+            <a:r>
+              <a:rPr lang="zh-CN" altLang="en-US" sz="2400" dirty="0" smtClean="0">
+                <a:latin typeface="PingFang SC Regular"/>
+                <a:ea typeface="PingFang SC Regular"/>
+                <a:cs typeface="PingFang SC Regular"/>
+                <a:sym typeface="PingFang SC Regular"/>
+              </a:rPr>
+              <a:t>：</a:t>
+            </a:r>
+            <a:r>
+              <a:rPr lang="en-US" altLang="zh-CN" sz="2400" dirty="0" smtClean="0">
+                <a:latin typeface="PingFang SC Regular"/>
+                <a:ea typeface="PingFang SC Regular"/>
+                <a:cs typeface="PingFang SC Regular"/>
+                <a:sym typeface="PingFang SC Regular"/>
+              </a:rPr>
+              <a:t>00</a:t>
+            </a:r>
+            <a:r>
+              <a:rPr lang="zh-CN" altLang="en-US" sz="2400" dirty="0" smtClean="0">
+                <a:latin typeface="PingFang SC Regular"/>
+                <a:ea typeface="PingFang SC Regular"/>
+                <a:cs typeface="PingFang SC Regular"/>
+                <a:sym typeface="PingFang SC Regular"/>
+              </a:rPr>
+              <a:t>。</a:t>
+            </a:r>
+            <a:endParaRPr lang="en-US" altLang="zh-CN" sz="2400" dirty="0" smtClean="0">
+              <a:latin typeface="PingFang SC Regular"/>
+              <a:ea typeface="PingFang SC Regular"/>
+              <a:cs typeface="PingFang SC Regular"/>
+              <a:sym typeface="PingFang SC Regular"/>
+            </a:endParaRPr>
+          </a:p>
+          <a:p>
+            <a:pPr lvl="0" defTabSz="457200">
+              <a:lnSpc>
+                <a:spcPct val="150000"/>
+              </a:lnSpc>
+              <a:spcBef>
+                <a:spcPts val="0"/>
+              </a:spcBef>
+              <a:tabLst>
+                <a:tab pos="355600" algn="l"/>
+                <a:tab pos="711200" algn="l"/>
+                <a:tab pos="1066800" algn="l"/>
+                <a:tab pos="1422400" algn="l"/>
+                <a:tab pos="1778000" algn="l"/>
+                <a:tab pos="2133600" algn="l"/>
+                <a:tab pos="2489200" algn="l"/>
+                <a:tab pos="2844800" algn="l"/>
+                <a:tab pos="3200400" algn="l"/>
+                <a:tab pos="3556000" algn="l"/>
+                <a:tab pos="3911600" algn="l"/>
+                <a:tab pos="4267200" algn="l"/>
+              </a:tabLst>
+              <a:defRPr sz="1800"/>
+            </a:pPr>
+            <a:r>
+              <a:rPr lang="zh-CN" altLang="en-US" sz="2400" dirty="0" smtClean="0">
+                <a:latin typeface="PingFang SC Regular"/>
+                <a:ea typeface="PingFang SC Regular"/>
+                <a:cs typeface="PingFang SC Regular"/>
+                <a:sym typeface="PingFang SC Regular"/>
+              </a:rPr>
+              <a:t>假设当前是</a:t>
+            </a:r>
+            <a:r>
+              <a:rPr lang="en-US" altLang="zh-CN" sz="2400" dirty="0" smtClean="0">
+                <a:latin typeface="PingFang SC Regular"/>
+                <a:ea typeface="PingFang SC Regular"/>
+                <a:cs typeface="PingFang SC Regular"/>
+                <a:sym typeface="PingFang SC Regular"/>
+              </a:rPr>
+              <a:t>1:30</a:t>
+            </a:r>
+            <a:r>
+              <a:rPr lang="zh-CN" altLang="en-US" sz="2400" dirty="0" smtClean="0">
+                <a:latin typeface="PingFang SC Regular"/>
+                <a:ea typeface="PingFang SC Regular"/>
+                <a:cs typeface="PingFang SC Regular"/>
+                <a:sym typeface="PingFang SC Regular"/>
+              </a:rPr>
+              <a:t>，此时</a:t>
+            </a:r>
+            <a:r>
+              <a:rPr lang="zh-CN" altLang="en-US" sz="2400" dirty="0" smtClean="0">
+                <a:latin typeface="PingFang SC Regular"/>
+                <a:ea typeface="PingFang SC Regular"/>
+                <a:cs typeface="PingFang SC Regular"/>
+                <a:sym typeface="PingFang SC Regular"/>
+              </a:rPr>
               <a:t>可以编辑</a:t>
             </a:r>
             <a:r>
@@ -15064,12 +15123,335 @@
               </a:rPr>
               <a:t>应用</a:t>
             </a:r>
-            <a:endParaRPr sz="2400" dirty="0">
+            <a:endParaRPr lang="en-US" altLang="zh-CN" sz="2400" dirty="0" smtClean="0">
               <a:latin typeface="PingFang SC Regular"/>
               <a:ea typeface="PingFang SC Regular"/>
               <a:cs typeface="PingFang SC Regular"/>
               <a:sym typeface="PingFang SC Regular"/>
             </a:endParaRPr>
+          </a:p>
+          <a:p>
+            <a:pPr lvl="0" defTabSz="457200">
+              <a:lnSpc>
+                <a:spcPct val="150000"/>
+              </a:lnSpc>
+              <a:spcBef>
+                <a:spcPts val="0"/>
+              </a:spcBef>
+              <a:tabLst>
+                <a:tab pos="355600" algn="l"/>
+                <a:tab pos="711200" algn="l"/>
+                <a:tab pos="1066800" algn="l"/>
+                <a:tab pos="1422400" algn="l"/>
+                <a:tab pos="1778000" algn="l"/>
+                <a:tab pos="2133600" algn="l"/>
+                <a:tab pos="2489200" algn="l"/>
+                <a:tab pos="2844800" algn="l"/>
+                <a:tab pos="3200400" algn="l"/>
+                <a:tab pos="3556000" algn="l"/>
+                <a:tab pos="3911600" algn="l"/>
+                <a:tab pos="4267200" algn="l"/>
+              </a:tabLst>
+              <a:defRPr sz="1800"/>
+            </a:pPr>
+            <a:endParaRPr lang="en-US" sz="2400" dirty="0">
+              <a:latin typeface="PingFang SC Regular"/>
+              <a:ea typeface="PingFang SC Regular"/>
+              <a:cs typeface="PingFang SC Regular"/>
+              <a:sym typeface="PingFang SC Regular"/>
+            </a:endParaRPr>
+          </a:p>
+          <a:p>
+            <a:pPr lvl="0" defTabSz="457200">
+              <a:lnSpc>
+                <a:spcPct val="150000"/>
+              </a:lnSpc>
+              <a:spcBef>
+                <a:spcPts val="0"/>
+              </a:spcBef>
+              <a:tabLst>
+                <a:tab pos="355600" algn="l"/>
+                <a:tab pos="711200" algn="l"/>
+                <a:tab pos="1066800" algn="l"/>
+                <a:tab pos="1422400" algn="l"/>
+                <a:tab pos="1778000" algn="l"/>
+                <a:tab pos="2133600" algn="l"/>
+                <a:tab pos="2489200" algn="l"/>
+                <a:tab pos="2844800" algn="l"/>
+                <a:tab pos="3200400" algn="l"/>
+                <a:tab pos="3556000" algn="l"/>
+                <a:tab pos="3911600" algn="l"/>
+                <a:tab pos="4267200" algn="l"/>
+              </a:tabLst>
+              <a:defRPr sz="1800"/>
+            </a:pPr>
+            <a:r>
+              <a:rPr lang="en-US" sz="2400" dirty="0" smtClean="0">
+                <a:latin typeface="PingFang SC Regular"/>
+                <a:ea typeface="PingFang SC Regular"/>
+                <a:cs typeface="PingFang SC Regular"/>
+                <a:sym typeface="PingFang SC Regular"/>
+              </a:rPr>
+              <a:t>2.</a:t>
+            </a:r>
+            <a:r>
+              <a:rPr lang="zh-CN" altLang="en-US" sz="2400" dirty="0" smtClean="0">
+                <a:latin typeface="PingFang SC Regular"/>
+                <a:ea typeface="PingFang SC Regular"/>
+                <a:cs typeface="PingFang SC Regular"/>
+                <a:sym typeface="PingFang SC Regular"/>
+              </a:rPr>
+              <a:t>动态修改运行中</a:t>
+            </a:r>
+            <a:r>
+              <a:rPr lang="en-US" altLang="zh-CN" sz="2400" dirty="0" smtClean="0">
+                <a:latin typeface="PingFang SC Regular"/>
+                <a:ea typeface="PingFang SC Regular"/>
+                <a:cs typeface="PingFang SC Regular"/>
+                <a:sym typeface="PingFang SC Regular"/>
+              </a:rPr>
+              <a:t>workflow</a:t>
+            </a:r>
+            <a:r>
+              <a:rPr lang="zh-CN" altLang="en-US" sz="2400" dirty="0" smtClean="0">
+                <a:latin typeface="PingFang SC Regular"/>
+                <a:ea typeface="PingFang SC Regular"/>
+                <a:cs typeface="PingFang SC Regular"/>
+                <a:sym typeface="PingFang SC Regular"/>
+              </a:rPr>
+              <a:t>的属性</a:t>
+            </a:r>
+            <a:endParaRPr lang="en-US" altLang="zh-CN" sz="2400" dirty="0" smtClean="0">
+              <a:latin typeface="PingFang SC Regular"/>
+              <a:ea typeface="PingFang SC Regular"/>
+              <a:cs typeface="PingFang SC Regular"/>
+              <a:sym typeface="PingFang SC Regular"/>
+            </a:endParaRPr>
+          </a:p>
+          <a:p>
+            <a:pPr defTabSz="457200">
+              <a:lnSpc>
+                <a:spcPct val="150000"/>
+              </a:lnSpc>
+              <a:spcBef>
+                <a:spcPts val="0"/>
+              </a:spcBef>
+              <a:tabLst>
+                <a:tab pos="355600" algn="l"/>
+                <a:tab pos="711200" algn="l"/>
+                <a:tab pos="1066800" algn="l"/>
+                <a:tab pos="1422400" algn="l"/>
+                <a:tab pos="1778000" algn="l"/>
+                <a:tab pos="2133600" algn="l"/>
+                <a:tab pos="2489200" algn="l"/>
+                <a:tab pos="2844800" algn="l"/>
+                <a:tab pos="3200400" algn="l"/>
+                <a:tab pos="3556000" algn="l"/>
+                <a:tab pos="3911600" algn="l"/>
+                <a:tab pos="4267200" algn="l"/>
+              </a:tabLst>
+              <a:defRPr sz="1800"/>
+            </a:pPr>
+            <a:r>
+              <a:rPr lang="zh-CN" altLang="en-US" sz="2400" dirty="0" smtClean="0">
+                <a:latin typeface="PingFang SC Regular"/>
+                <a:ea typeface="PingFang SC Regular"/>
+                <a:cs typeface="PingFang SC Regular"/>
+                <a:sym typeface="PingFang SC Regular"/>
+              </a:rPr>
+              <a:t>可以通过</a:t>
+            </a:r>
+            <a:r>
+              <a:rPr lang="en-US" altLang="zh-CN" sz="2400" dirty="0" err="1" smtClean="0">
+                <a:latin typeface="PingFang SC Regular"/>
+                <a:ea typeface="PingFang SC Regular"/>
+                <a:cs typeface="PingFang SC Regular"/>
+                <a:sym typeface="PingFang SC Regular"/>
+              </a:rPr>
+              <a:t>oozie</a:t>
+            </a:r>
+            <a:r>
+              <a:rPr lang="zh-CN" altLang="en-US" sz="2400" dirty="0" smtClean="0">
+                <a:latin typeface="PingFang SC Regular"/>
+                <a:ea typeface="PingFang SC Regular"/>
+                <a:cs typeface="PingFang SC Regular"/>
+                <a:sym typeface="PingFang SC Regular"/>
+              </a:rPr>
+              <a:t>的</a:t>
+            </a:r>
+            <a:r>
+              <a:rPr lang="en-US" altLang="zh-CN" sz="2400" dirty="0">
+                <a:latin typeface="PingFang SC Regular"/>
+                <a:ea typeface="PingFang SC Regular"/>
+                <a:cs typeface="PingFang SC Regular"/>
+                <a:sym typeface="PingFang SC Regular"/>
+              </a:rPr>
+              <a:t>-</a:t>
+            </a:r>
+            <a:r>
+              <a:rPr lang="en-US" sz="2400" dirty="0" smtClean="0">
+                <a:latin typeface="PingFang SC Regular"/>
+                <a:ea typeface="PingFang SC Regular"/>
+                <a:cs typeface="PingFang SC Regular"/>
+                <a:sym typeface="PingFang SC Regular"/>
+              </a:rPr>
+              <a:t>change</a:t>
+            </a:r>
+            <a:r>
+              <a:rPr lang="zh-CN" altLang="en-US" sz="2400" dirty="0" smtClean="0">
+                <a:latin typeface="PingFang SC Regular"/>
+                <a:ea typeface="PingFang SC Regular"/>
+                <a:cs typeface="PingFang SC Regular"/>
+                <a:sym typeface="PingFang SC Regular"/>
+              </a:rPr>
+              <a:t>命令对运行时的属性进行修改，比如</a:t>
+            </a:r>
+            <a:r>
+              <a:rPr lang="en-US" altLang="zh-CN" sz="2400" dirty="0" smtClean="0">
+                <a:latin typeface="PingFang SC Regular"/>
+                <a:ea typeface="PingFang SC Regular"/>
+                <a:cs typeface="PingFang SC Regular"/>
+                <a:sym typeface="PingFang SC Regular"/>
+              </a:rPr>
+              <a:t>concurrency</a:t>
+            </a:r>
+            <a:r>
+              <a:rPr lang="zh-CN" altLang="en-US" sz="2400" dirty="0" smtClean="0">
+                <a:latin typeface="PingFang SC Regular"/>
+                <a:ea typeface="PingFang SC Regular"/>
+                <a:cs typeface="PingFang SC Regular"/>
+                <a:sym typeface="PingFang SC Regular"/>
+              </a:rPr>
+              <a:t>，</a:t>
+            </a:r>
+            <a:r>
+              <a:rPr lang="en-US" altLang="zh-CN" sz="2400" dirty="0" err="1" smtClean="0">
+                <a:latin typeface="PingFang SC Regular"/>
+                <a:ea typeface="PingFang SC Regular"/>
+                <a:cs typeface="PingFang SC Regular"/>
+                <a:sym typeface="PingFang SC Regular"/>
+              </a:rPr>
+              <a:t>endtime</a:t>
+            </a:r>
+            <a:r>
+              <a:rPr lang="zh-CN" altLang="en-US" sz="2400" dirty="0" smtClean="0">
+                <a:latin typeface="PingFang SC Regular"/>
+                <a:ea typeface="PingFang SC Regular"/>
+                <a:cs typeface="PingFang SC Regular"/>
+                <a:sym typeface="PingFang SC Regular"/>
+              </a:rPr>
+              <a:t>等：</a:t>
+            </a:r>
+            <a:endParaRPr lang="en-US" altLang="zh-CN" sz="2400" dirty="0" smtClean="0">
+              <a:latin typeface="PingFang SC Regular"/>
+              <a:ea typeface="PingFang SC Regular"/>
+              <a:cs typeface="PingFang SC Regular"/>
+              <a:sym typeface="PingFang SC Regular"/>
+            </a:endParaRPr>
+          </a:p>
+          <a:p>
+            <a:pPr defTabSz="457200">
+              <a:lnSpc>
+                <a:spcPct val="150000"/>
+              </a:lnSpc>
+              <a:spcBef>
+                <a:spcPts val="0"/>
+              </a:spcBef>
+              <a:tabLst>
+                <a:tab pos="355600" algn="l"/>
+                <a:tab pos="711200" algn="l"/>
+                <a:tab pos="1066800" algn="l"/>
+                <a:tab pos="1422400" algn="l"/>
+                <a:tab pos="1778000" algn="l"/>
+                <a:tab pos="2133600" algn="l"/>
+                <a:tab pos="2489200" algn="l"/>
+                <a:tab pos="2844800" algn="l"/>
+                <a:tab pos="3200400" algn="l"/>
+                <a:tab pos="3556000" algn="l"/>
+                <a:tab pos="3911600" algn="l"/>
+                <a:tab pos="4267200" algn="l"/>
+              </a:tabLst>
+              <a:defRPr sz="1800"/>
+            </a:pPr>
+            <a:r>
+              <a:rPr lang="nl-NL" sz="2000" dirty="0" err="1">
+                <a:solidFill>
+                  <a:schemeClr val="accent2"/>
+                </a:solidFill>
+              </a:rPr>
+              <a:t>oozie</a:t>
+            </a:r>
+            <a:r>
+              <a:rPr lang="nl-NL" sz="2000" dirty="0">
+                <a:solidFill>
+                  <a:schemeClr val="accent2"/>
+                </a:solidFill>
+              </a:rPr>
+              <a:t> job -change 0000076-140402104721144-oozie-joe-C -</a:t>
+            </a:r>
+            <a:r>
+              <a:rPr lang="nl-NL" sz="2000" dirty="0" err="1">
+                <a:solidFill>
+                  <a:schemeClr val="accent2"/>
+                </a:solidFill>
+              </a:rPr>
+              <a:t>value</a:t>
+            </a:r>
+            <a:r>
+              <a:rPr lang="nl-NL" sz="2000" dirty="0">
+                <a:solidFill>
+                  <a:schemeClr val="accent2"/>
+                </a:solidFill>
+              </a:rPr>
+              <a:t> </a:t>
+            </a:r>
+            <a:r>
+              <a:rPr lang="nl-NL" sz="2000" dirty="0" err="1">
+                <a:solidFill>
+                  <a:schemeClr val="accent2"/>
+                </a:solidFill>
+              </a:rPr>
+              <a:t>endtime</a:t>
+            </a:r>
+            <a:r>
+              <a:rPr lang="nl-NL" sz="2000" dirty="0">
+                <a:solidFill>
+                  <a:schemeClr val="accent2"/>
+                </a:solidFill>
+              </a:rPr>
+              <a:t>=2014-12-01T05:00Z </a:t>
+            </a:r>
+            <a:endParaRPr lang="nl-NL" sz="2000" dirty="0">
+              <a:solidFill>
+                <a:schemeClr val="accent2"/>
+              </a:solidFill>
+            </a:endParaRPr>
+          </a:p>
+          <a:p>
+            <a:pPr defTabSz="457200">
+              <a:lnSpc>
+                <a:spcPct val="150000"/>
+              </a:lnSpc>
+              <a:spcBef>
+                <a:spcPts val="0"/>
+              </a:spcBef>
+              <a:tabLst>
+                <a:tab pos="355600" algn="l"/>
+                <a:tab pos="711200" algn="l"/>
+                <a:tab pos="1066800" algn="l"/>
+                <a:tab pos="1422400" algn="l"/>
+                <a:tab pos="1778000" algn="l"/>
+                <a:tab pos="2133600" algn="l"/>
+                <a:tab pos="2489200" algn="l"/>
+                <a:tab pos="2844800" algn="l"/>
+                <a:tab pos="3200400" algn="l"/>
+                <a:tab pos="3556000" algn="l"/>
+                <a:tab pos="3911600" algn="l"/>
+                <a:tab pos="4267200" algn="l"/>
+              </a:tabLst>
+              <a:defRPr sz="1800"/>
+            </a:pPr>
+            <a:endParaRPr lang="fr-FR" sz="2400" dirty="0"/>
           </a:p>
         </p:txBody>
       </p:sp>
@@ -15124,6 +15506,681 @@
     <p:extLst>
       <p:ext uri="{BB962C8B-B14F-4D97-AF65-F5344CB8AC3E}">
         <p14:creationId xmlns:p14="http://schemas.microsoft.com/office/powerpoint/2010/main" val="3779239959"/>
+      </p:ext>
+    </p:extLst>
+  </p:cSld>
+  <p:clrMapOvr>
+    <a:masterClrMapping/>
+  </p:clrMapOvr>
+  <p:transition xmlns:p14="http://schemas.microsoft.com/office/powerpoint/2010/main" spd="med"/>
+  <p:timing>
+    <p:tnLst>
+      <p:par>
+        <p:cTn xmlns:p14="http://schemas.microsoft.com/office/powerpoint/2010/main" id="1" dur="indefinite" restart="never" nodeType="tmRoot"/>
+      </p:par>
+    </p:tnLst>
+  </p:timing>
+</p:sld>
+</file>
+
+<file path=ppt/slides/slide15.xml><?xml version="1.0" encoding="utf-8"?>
+<p:sld xmlns:a="http://schemas.openxmlformats.org/drawingml/2006/main" xmlns:r="http://schemas.openxmlformats.org/officeDocument/2006/relationships" xmlns:p="http://schemas.openxmlformats.org/presentationml/2006/main">
+  <p:cSld>
+    <p:spTree>
+      <p:nvGrpSpPr>
+        <p:cNvPr id="1" name=""/>
+        <p:cNvGrpSpPr/>
+        <p:nvPr/>
+      </p:nvGrpSpPr>
+      <p:grpSpPr>
+        <a:xfrm>
+          <a:off x="0" y="0"/>
+          <a:ext cx="0" cy="0"/>
+          <a:chOff x="0" y="0"/>
+          <a:chExt cx="0" cy="0"/>
+        </a:xfrm>
+      </p:grpSpPr>
+      <p:sp>
+        <p:nvSpPr>
+          <p:cNvPr id="310" name="Shape 310"/>
+          <p:cNvSpPr>
+            <a:spLocks noGrp="1"/>
+          </p:cNvSpPr>
+          <p:nvPr>
+            <p:ph type="title"/>
+          </p:nvPr>
+        </p:nvSpPr>
+        <p:spPr>
+          <a:prstGeom prst="rect">
+            <a:avLst/>
+          </a:prstGeom>
+        </p:spPr>
+        <p:txBody>
+          <a:bodyPr>
+            <a:normAutofit fontScale="90000"/>
+          </a:bodyPr>
+          <a:lstStyle/>
+          <a:p>
+            <a:pPr>
+              <a:defRPr sz="1800" b="0" cap="none" spc="0">
+                <a:solidFill>
+                  <a:srgbClr val="000000"/>
+                </a:solidFill>
+              </a:defRPr>
+            </a:pPr>
+            <a:r>
+              <a:rPr lang="zh-CN" altLang="en-US" sz="3600" b="1" cap="all" spc="-144" dirty="0" smtClean="0">
+                <a:solidFill>
+                  <a:srgbClr val="00B56E"/>
+                </a:solidFill>
+              </a:rPr>
+              <a:t>验证</a:t>
+            </a:r>
+            <a:r>
+              <a:rPr lang="en-US" sz="3600" b="1" cap="all" spc="-144" dirty="0" err="1" smtClean="0">
+                <a:solidFill>
+                  <a:srgbClr val="00B56E"/>
+                </a:solidFill>
+              </a:rPr>
+              <a:t>W</a:t>
+            </a:r>
+            <a:r>
+              <a:rPr sz="3600" b="1" cap="all" spc="-144" dirty="0" err="1" smtClean="0">
+                <a:solidFill>
+                  <a:srgbClr val="00B56E"/>
+                </a:solidFill>
+              </a:rPr>
+              <a:t>orkflow的</a:t>
+            </a:r>
+            <a:r>
+              <a:rPr lang="en-US" altLang="zh-CN" sz="3600" b="1" cap="all" spc="-144" dirty="0" err="1" smtClean="0">
+                <a:solidFill>
+                  <a:srgbClr val="00B56E"/>
+                </a:solidFill>
+              </a:rPr>
+              <a:t>XML</a:t>
+            </a:r>
+            <a:r>
+              <a:rPr lang="zh-CN" altLang="en-US" sz="3600" b="1" cap="all" spc="-144" dirty="0" smtClean="0">
+                <a:solidFill>
+                  <a:srgbClr val="00B56E"/>
+                </a:solidFill>
+              </a:rPr>
+              <a:t>文件</a:t>
+            </a:r>
+            <a:r>
+              <a:rPr lang="en-US" altLang="zh-CN" dirty="0"/>
+              <a:t/>
+            </a:r>
+            <a:br>
+              <a:rPr lang="en-US" altLang="zh-CN" dirty="0"/>
+            </a:br>
+            <a:endParaRPr sz="3600" b="1" cap="all" spc="-144" dirty="0">
+              <a:solidFill>
+                <a:srgbClr val="00B56E"/>
+              </a:solidFill>
+            </a:endParaRPr>
+          </a:p>
+        </p:txBody>
+      </p:sp>
+      <p:sp>
+        <p:nvSpPr>
+          <p:cNvPr id="311" name="Shape 311"/>
+          <p:cNvSpPr>
+            <a:spLocks noGrp="1"/>
+          </p:cNvSpPr>
+          <p:nvPr>
+            <p:ph type="body" idx="1"/>
+          </p:nvPr>
+        </p:nvSpPr>
+        <p:spPr>
+          <a:xfrm>
+            <a:off x="381000" y="1187231"/>
+            <a:ext cx="12242800" cy="8733137"/>
+          </a:xfrm>
+          <a:prstGeom prst="rect">
+            <a:avLst/>
+          </a:prstGeom>
+        </p:spPr>
+        <p:txBody>
+          <a:bodyPr/>
+          <a:lstStyle/>
+          <a:p>
+            <a:pPr lvl="0" defTabSz="457200">
+              <a:lnSpc>
+                <a:spcPct val="150000"/>
+              </a:lnSpc>
+              <a:spcBef>
+                <a:spcPts val="0"/>
+              </a:spcBef>
+              <a:tabLst>
+                <a:tab pos="355600" algn="l"/>
+                <a:tab pos="711200" algn="l"/>
+                <a:tab pos="1066800" algn="l"/>
+                <a:tab pos="1422400" algn="l"/>
+                <a:tab pos="1778000" algn="l"/>
+                <a:tab pos="2133600" algn="l"/>
+                <a:tab pos="2489200" algn="l"/>
+                <a:tab pos="2844800" algn="l"/>
+                <a:tab pos="3200400" algn="l"/>
+                <a:tab pos="3556000" algn="l"/>
+                <a:tab pos="3911600" algn="l"/>
+                <a:tab pos="4267200" algn="l"/>
+              </a:tabLst>
+              <a:defRPr sz="1800"/>
+            </a:pPr>
+            <a:r>
+              <a:rPr lang="en-US" altLang="zh-CN" sz="2400" dirty="0" smtClean="0">
+                <a:latin typeface="PingFang SC Regular"/>
+                <a:ea typeface="PingFang SC Regular"/>
+                <a:cs typeface="PingFang SC Regular"/>
+                <a:sym typeface="PingFang SC Regular"/>
+              </a:rPr>
+              <a:t>1. </a:t>
+            </a:r>
+            <a:r>
+              <a:rPr lang="en-US" altLang="zh-CN" sz="2400" dirty="0" err="1" smtClean="0">
+                <a:latin typeface="PingFang SC Regular"/>
+                <a:ea typeface="PingFang SC Regular"/>
+                <a:cs typeface="PingFang SC Regular"/>
+                <a:sym typeface="PingFang SC Regular"/>
+              </a:rPr>
+              <a:t>Oozie</a:t>
+            </a:r>
+            <a:r>
+              <a:rPr lang="zh-CN" altLang="en-US" sz="2400" dirty="0" smtClean="0">
+                <a:latin typeface="PingFang SC Regular"/>
+                <a:ea typeface="PingFang SC Regular"/>
+                <a:cs typeface="PingFang SC Regular"/>
+                <a:sym typeface="PingFang SC Regular"/>
+              </a:rPr>
+              <a:t>提供了</a:t>
+            </a:r>
+            <a:r>
+              <a:rPr lang="en-US" altLang="zh-CN" sz="2400" dirty="0" smtClean="0">
+                <a:latin typeface="PingFang SC Regular"/>
+                <a:ea typeface="PingFang SC Regular"/>
+                <a:cs typeface="PingFang SC Regular"/>
+                <a:sym typeface="PingFang SC Regular"/>
+              </a:rPr>
+              <a:t>validate </a:t>
+            </a:r>
+            <a:r>
+              <a:rPr lang="zh-CN" altLang="en-US" sz="2400" dirty="0" smtClean="0">
+                <a:latin typeface="PingFang SC Regular"/>
+                <a:ea typeface="PingFang SC Regular"/>
+                <a:cs typeface="PingFang SC Regular"/>
+                <a:sym typeface="PingFang SC Regular"/>
+              </a:rPr>
+              <a:t>命令可以用来验证</a:t>
+            </a:r>
+            <a:r>
+              <a:rPr lang="en-US" altLang="zh-CN" sz="2400" dirty="0" smtClean="0">
+                <a:latin typeface="PingFang SC Regular"/>
+                <a:ea typeface="PingFang SC Regular"/>
+                <a:cs typeface="PingFang SC Regular"/>
+                <a:sym typeface="PingFang SC Regular"/>
+              </a:rPr>
+              <a:t>XML</a:t>
+            </a:r>
+            <a:r>
+              <a:rPr lang="zh-CN" altLang="en-US" sz="2400" dirty="0" smtClean="0">
+                <a:latin typeface="PingFang SC Regular"/>
+                <a:ea typeface="PingFang SC Regular"/>
+                <a:cs typeface="PingFang SC Regular"/>
+                <a:sym typeface="PingFang SC Regular"/>
+              </a:rPr>
+              <a:t>（主要是语法上的检查）：</a:t>
+            </a:r>
+            <a:endParaRPr lang="en-US" altLang="zh-CN" sz="2400" dirty="0" smtClean="0">
+              <a:latin typeface="PingFang SC Regular"/>
+              <a:ea typeface="PingFang SC Regular"/>
+              <a:cs typeface="PingFang SC Regular"/>
+              <a:sym typeface="PingFang SC Regular"/>
+            </a:endParaRPr>
+          </a:p>
+          <a:p>
+            <a:pPr lvl="0" defTabSz="457200">
+              <a:lnSpc>
+                <a:spcPct val="150000"/>
+              </a:lnSpc>
+              <a:spcBef>
+                <a:spcPts val="0"/>
+              </a:spcBef>
+              <a:tabLst>
+                <a:tab pos="355600" algn="l"/>
+                <a:tab pos="711200" algn="l"/>
+                <a:tab pos="1066800" algn="l"/>
+                <a:tab pos="1422400" algn="l"/>
+                <a:tab pos="1778000" algn="l"/>
+                <a:tab pos="2133600" algn="l"/>
+                <a:tab pos="2489200" algn="l"/>
+                <a:tab pos="2844800" algn="l"/>
+                <a:tab pos="3200400" algn="l"/>
+                <a:tab pos="3556000" algn="l"/>
+                <a:tab pos="3911600" algn="l"/>
+                <a:tab pos="4267200" algn="l"/>
+              </a:tabLst>
+              <a:defRPr sz="1800"/>
+            </a:pPr>
+            <a:r>
+              <a:rPr lang="en-US" altLang="zh-CN" sz="2400" dirty="0" err="1" smtClean="0">
+                <a:solidFill>
+                  <a:srgbClr val="00882B"/>
+                </a:solidFill>
+                <a:latin typeface="PingFang SC Regular"/>
+                <a:ea typeface="PingFang SC Regular"/>
+                <a:cs typeface="PingFang SC Regular"/>
+                <a:sym typeface="PingFang SC Regular"/>
+              </a:rPr>
+              <a:t>oozie</a:t>
+            </a:r>
+            <a:r>
+              <a:rPr lang="en-US" altLang="zh-CN" sz="2400" dirty="0" smtClean="0">
+                <a:solidFill>
+                  <a:srgbClr val="00882B"/>
+                </a:solidFill>
+                <a:latin typeface="PingFang SC Regular"/>
+                <a:ea typeface="PingFang SC Regular"/>
+                <a:cs typeface="PingFang SC Regular"/>
+                <a:sym typeface="PingFang SC Regular"/>
+              </a:rPr>
+              <a:t> validate </a:t>
+            </a:r>
+            <a:r>
+              <a:rPr lang="en-US" altLang="zh-CN" sz="2400" dirty="0" err="1" smtClean="0">
+                <a:solidFill>
+                  <a:srgbClr val="00882B"/>
+                </a:solidFill>
+                <a:latin typeface="PingFang SC Regular"/>
+                <a:ea typeface="PingFang SC Regular"/>
+                <a:cs typeface="PingFang SC Regular"/>
+                <a:sym typeface="PingFang SC Regular"/>
+              </a:rPr>
+              <a:t>my_workflow.xml</a:t>
+            </a:r>
+            <a:endParaRPr lang="en-US" altLang="zh-CN" sz="2400" dirty="0" smtClean="0">
+              <a:solidFill>
+                <a:srgbClr val="00882B"/>
+              </a:solidFill>
+              <a:latin typeface="PingFang SC Regular"/>
+              <a:ea typeface="PingFang SC Regular"/>
+              <a:cs typeface="PingFang SC Regular"/>
+              <a:sym typeface="PingFang SC Regular"/>
+            </a:endParaRPr>
+          </a:p>
+          <a:p>
+            <a:pPr lvl="0" defTabSz="457200">
+              <a:lnSpc>
+                <a:spcPct val="150000"/>
+              </a:lnSpc>
+              <a:spcBef>
+                <a:spcPts val="0"/>
+              </a:spcBef>
+              <a:tabLst>
+                <a:tab pos="355600" algn="l"/>
+                <a:tab pos="711200" algn="l"/>
+                <a:tab pos="1066800" algn="l"/>
+                <a:tab pos="1422400" algn="l"/>
+                <a:tab pos="1778000" algn="l"/>
+                <a:tab pos="2133600" algn="l"/>
+                <a:tab pos="2489200" algn="l"/>
+                <a:tab pos="2844800" algn="l"/>
+                <a:tab pos="3200400" algn="l"/>
+                <a:tab pos="3556000" algn="l"/>
+                <a:tab pos="3911600" algn="l"/>
+                <a:tab pos="4267200" algn="l"/>
+              </a:tabLst>
+              <a:defRPr sz="1800"/>
+            </a:pPr>
+            <a:endParaRPr lang="en-US" sz="2400" dirty="0" smtClean="0">
+              <a:latin typeface="PingFang SC Regular"/>
+              <a:ea typeface="PingFang SC Regular"/>
+              <a:cs typeface="PingFang SC Regular"/>
+              <a:sym typeface="PingFang SC Regular"/>
+            </a:endParaRPr>
+          </a:p>
+          <a:p>
+            <a:pPr lvl="0" defTabSz="457200">
+              <a:lnSpc>
+                <a:spcPct val="150000"/>
+              </a:lnSpc>
+              <a:spcBef>
+                <a:spcPts val="0"/>
+              </a:spcBef>
+              <a:tabLst>
+                <a:tab pos="355600" algn="l"/>
+                <a:tab pos="711200" algn="l"/>
+                <a:tab pos="1066800" algn="l"/>
+                <a:tab pos="1422400" algn="l"/>
+                <a:tab pos="1778000" algn="l"/>
+                <a:tab pos="2133600" algn="l"/>
+                <a:tab pos="2489200" algn="l"/>
+                <a:tab pos="2844800" algn="l"/>
+                <a:tab pos="3200400" algn="l"/>
+                <a:tab pos="3556000" algn="l"/>
+                <a:tab pos="3911600" algn="l"/>
+                <a:tab pos="4267200" algn="l"/>
+              </a:tabLst>
+              <a:defRPr sz="1800"/>
+            </a:pPr>
+            <a:r>
+              <a:rPr lang="en-US" altLang="zh-CN" sz="2400" dirty="0" smtClean="0">
+                <a:latin typeface="PingFang SC Regular"/>
+                <a:ea typeface="PingFang SC Regular"/>
+                <a:cs typeface="PingFang SC Regular"/>
+                <a:sym typeface="PingFang SC Regular"/>
+              </a:rPr>
+              <a:t>2. </a:t>
+            </a:r>
+            <a:r>
+              <a:rPr lang="zh-CN" altLang="en-US" sz="2400" dirty="0" smtClean="0">
+                <a:latin typeface="PingFang SC Regular"/>
+                <a:ea typeface="PingFang SC Regular"/>
+                <a:cs typeface="PingFang SC Regular"/>
+                <a:sym typeface="PingFang SC Regular"/>
+              </a:rPr>
+              <a:t>另外一种方式也可以来验证</a:t>
+            </a:r>
+            <a:r>
+              <a:rPr lang="en-US" altLang="zh-CN" sz="2400" dirty="0" smtClean="0">
+                <a:latin typeface="PingFang SC Regular"/>
+                <a:ea typeface="PingFang SC Regular"/>
+                <a:cs typeface="PingFang SC Regular"/>
+                <a:sym typeface="PingFang SC Regular"/>
+              </a:rPr>
+              <a:t>XML</a:t>
+            </a:r>
+            <a:r>
+              <a:rPr lang="zh-CN" altLang="en-US" sz="2400" dirty="0" smtClean="0">
+                <a:latin typeface="PingFang SC Regular"/>
+                <a:ea typeface="PingFang SC Regular"/>
+                <a:cs typeface="PingFang SC Regular"/>
+                <a:sym typeface="PingFang SC Regular"/>
+              </a:rPr>
+              <a:t>：</a:t>
+            </a:r>
+            <a:r>
+              <a:rPr lang="en-US" altLang="zh-CN" sz="2400" dirty="0" err="1" smtClean="0">
+                <a:latin typeface="PingFang SC Regular"/>
+                <a:ea typeface="PingFang SC Regular"/>
+                <a:cs typeface="PingFang SC Regular"/>
+                <a:sym typeface="PingFang SC Regular"/>
+              </a:rPr>
+              <a:t>dryrun</a:t>
+            </a:r>
+            <a:r>
+              <a:rPr lang="zh-CN" altLang="en-US" sz="2400" dirty="0" smtClean="0">
+                <a:latin typeface="PingFang SC Regular"/>
+                <a:ea typeface="PingFang SC Regular"/>
+                <a:cs typeface="PingFang SC Regular"/>
+                <a:sym typeface="PingFang SC Regular"/>
+              </a:rPr>
+              <a:t>，会将</a:t>
+            </a:r>
+            <a:r>
+              <a:rPr lang="zh-CN" altLang="en-US" sz="2400" dirty="0" smtClean="0">
+                <a:latin typeface="PingFang SC Regular"/>
+                <a:ea typeface="PingFang SC Regular"/>
+                <a:cs typeface="PingFang SC Regular"/>
+                <a:sym typeface="PingFang SC Regular"/>
+              </a:rPr>
+              <a:t>属性配置文件一起考虑进去：</a:t>
+            </a:r>
+            <a:endParaRPr lang="en-US" altLang="zh-CN" sz="2400" dirty="0" smtClean="0">
+              <a:latin typeface="PingFang SC Regular"/>
+              <a:ea typeface="PingFang SC Regular"/>
+              <a:cs typeface="PingFang SC Regular"/>
+              <a:sym typeface="PingFang SC Regular"/>
+            </a:endParaRPr>
+          </a:p>
+          <a:p>
+            <a:pPr defTabSz="457200">
+              <a:lnSpc>
+                <a:spcPct val="150000"/>
+              </a:lnSpc>
+              <a:spcBef>
+                <a:spcPts val="0"/>
+              </a:spcBef>
+              <a:tabLst>
+                <a:tab pos="355600" algn="l"/>
+                <a:tab pos="711200" algn="l"/>
+                <a:tab pos="1066800" algn="l"/>
+                <a:tab pos="1422400" algn="l"/>
+                <a:tab pos="1778000" algn="l"/>
+                <a:tab pos="2133600" algn="l"/>
+                <a:tab pos="2489200" algn="l"/>
+                <a:tab pos="2844800" algn="l"/>
+                <a:tab pos="3200400" algn="l"/>
+                <a:tab pos="3556000" algn="l"/>
+                <a:tab pos="3911600" algn="l"/>
+                <a:tab pos="4267200" algn="l"/>
+              </a:tabLst>
+              <a:defRPr sz="1800"/>
+            </a:pPr>
+            <a:r>
+              <a:rPr lang="en-US" sz="2400" dirty="0" err="1" smtClean="0">
+                <a:solidFill>
+                  <a:srgbClr val="00882B"/>
+                </a:solidFill>
+              </a:rPr>
+              <a:t>oozie</a:t>
+            </a:r>
+            <a:r>
+              <a:rPr lang="en-US" sz="2400" dirty="0" smtClean="0">
+                <a:solidFill>
+                  <a:srgbClr val="00882B"/>
+                </a:solidFill>
+              </a:rPr>
+              <a:t> </a:t>
+            </a:r>
+            <a:r>
+              <a:rPr lang="en-US" sz="2400" dirty="0">
+                <a:solidFill>
+                  <a:srgbClr val="00882B"/>
+                </a:solidFill>
+              </a:rPr>
+              <a:t>job -</a:t>
+            </a:r>
+            <a:r>
+              <a:rPr lang="en-US" sz="2400" dirty="0" err="1">
+                <a:solidFill>
+                  <a:srgbClr val="00882B"/>
+                </a:solidFill>
+              </a:rPr>
+              <a:t>dryrun</a:t>
+            </a:r>
+            <a:r>
+              <a:rPr lang="en-US" sz="2400" dirty="0">
+                <a:solidFill>
+                  <a:srgbClr val="00882B"/>
+                </a:solidFill>
+              </a:rPr>
+              <a:t> -</a:t>
+            </a:r>
+            <a:r>
+              <a:rPr lang="en-US" sz="2400" dirty="0" err="1">
+                <a:solidFill>
+                  <a:srgbClr val="00882B"/>
+                </a:solidFill>
+              </a:rPr>
+              <a:t>config</a:t>
+            </a:r>
+            <a:r>
+              <a:rPr lang="en-US" sz="2400" dirty="0">
+                <a:solidFill>
+                  <a:srgbClr val="00882B"/>
+                </a:solidFill>
+              </a:rPr>
+              <a:t> </a:t>
+            </a:r>
+            <a:r>
+              <a:rPr lang="en-US" sz="2400" dirty="0" err="1">
+                <a:solidFill>
+                  <a:srgbClr val="00882B"/>
+                </a:solidFill>
+              </a:rPr>
+              <a:t>coord_job.properties</a:t>
+            </a:r>
+            <a:r>
+              <a:rPr lang="en-US" sz="2400" dirty="0">
+                <a:solidFill>
+                  <a:srgbClr val="00882B"/>
+                </a:solidFill>
+              </a:rPr>
+              <a:t> </a:t>
+            </a:r>
+            <a:endParaRPr lang="en-US" sz="2400" dirty="0" smtClean="0">
+              <a:solidFill>
+                <a:srgbClr val="00882B"/>
+              </a:solidFill>
+            </a:endParaRPr>
+          </a:p>
+          <a:p>
+            <a:pPr defTabSz="457200">
+              <a:lnSpc>
+                <a:spcPct val="150000"/>
+              </a:lnSpc>
+              <a:spcBef>
+                <a:spcPts val="0"/>
+              </a:spcBef>
+              <a:tabLst>
+                <a:tab pos="355600" algn="l"/>
+                <a:tab pos="711200" algn="l"/>
+                <a:tab pos="1066800" algn="l"/>
+                <a:tab pos="1422400" algn="l"/>
+                <a:tab pos="1778000" algn="l"/>
+                <a:tab pos="2133600" algn="l"/>
+                <a:tab pos="2489200" algn="l"/>
+                <a:tab pos="2844800" algn="l"/>
+                <a:tab pos="3200400" algn="l"/>
+                <a:tab pos="3556000" algn="l"/>
+                <a:tab pos="3911600" algn="l"/>
+                <a:tab pos="4267200" algn="l"/>
+              </a:tabLst>
+              <a:defRPr sz="1800"/>
+            </a:pPr>
+            <a:r>
+              <a:rPr lang="zh-CN" altLang="en-US" sz="2400" dirty="0" smtClean="0"/>
+              <a:t>此命令会将整个生命周期所有的实例展示出来</a:t>
+            </a:r>
+            <a:endParaRPr lang="en-US" sz="2400" dirty="0" smtClean="0"/>
+          </a:p>
+          <a:p>
+            <a:pPr lvl="0" defTabSz="457200">
+              <a:lnSpc>
+                <a:spcPct val="150000"/>
+              </a:lnSpc>
+              <a:spcBef>
+                <a:spcPts val="0"/>
+              </a:spcBef>
+              <a:tabLst>
+                <a:tab pos="355600" algn="l"/>
+                <a:tab pos="711200" algn="l"/>
+                <a:tab pos="1066800" algn="l"/>
+                <a:tab pos="1422400" algn="l"/>
+                <a:tab pos="1778000" algn="l"/>
+                <a:tab pos="2133600" algn="l"/>
+                <a:tab pos="2489200" algn="l"/>
+                <a:tab pos="2844800" algn="l"/>
+                <a:tab pos="3200400" algn="l"/>
+                <a:tab pos="3556000" algn="l"/>
+                <a:tab pos="3911600" algn="l"/>
+                <a:tab pos="4267200" algn="l"/>
+              </a:tabLst>
+              <a:defRPr sz="1800"/>
+            </a:pPr>
+            <a:endParaRPr lang="en-US" sz="2400" b="1" dirty="0" smtClean="0">
+              <a:latin typeface="PingFang SC Regular"/>
+              <a:ea typeface="PingFang SC Regular"/>
+              <a:cs typeface="PingFang SC Regular"/>
+              <a:sym typeface="PingFang SC Regular"/>
+            </a:endParaRPr>
+          </a:p>
+          <a:p>
+            <a:pPr lvl="0" defTabSz="457200">
+              <a:lnSpc>
+                <a:spcPct val="150000"/>
+              </a:lnSpc>
+              <a:spcBef>
+                <a:spcPts val="0"/>
+              </a:spcBef>
+              <a:tabLst>
+                <a:tab pos="355600" algn="l"/>
+                <a:tab pos="711200" algn="l"/>
+                <a:tab pos="1066800" algn="l"/>
+                <a:tab pos="1422400" algn="l"/>
+                <a:tab pos="1778000" algn="l"/>
+                <a:tab pos="2133600" algn="l"/>
+                <a:tab pos="2489200" algn="l"/>
+                <a:tab pos="2844800" algn="l"/>
+                <a:tab pos="3200400" algn="l"/>
+                <a:tab pos="3556000" algn="l"/>
+                <a:tab pos="3911600" algn="l"/>
+                <a:tab pos="4267200" algn="l"/>
+              </a:tabLst>
+              <a:defRPr sz="1800"/>
+            </a:pPr>
+            <a:endParaRPr sz="2400" dirty="0">
+              <a:latin typeface="PingFang SC Regular"/>
+              <a:ea typeface="PingFang SC Regular"/>
+              <a:cs typeface="PingFang SC Regular"/>
+              <a:sym typeface="PingFang SC Regular"/>
+            </a:endParaRPr>
+          </a:p>
+        </p:txBody>
+      </p:sp>
+      <p:sp>
+        <p:nvSpPr>
+          <p:cNvPr id="313" name="Shape 313"/>
+          <p:cNvSpPr>
+            <a:spLocks noGrp="1"/>
+          </p:cNvSpPr>
+          <p:nvPr>
+            <p:ph type="sldNum" sz="quarter" idx="2"/>
+          </p:nvPr>
+        </p:nvSpPr>
+        <p:spPr>
+          <a:prstGeom prst="rect">
+            <a:avLst/>
+          </a:prstGeom>
+          <a:extLst>
+            <a:ext uri="{C572A759-6A51-4108-AA02-DFA0A04FC94B}">
+              <ma14:wrappingTextBoxFlag xmlns:ma14="http://schemas.microsoft.com/office/mac/drawingml/2011/main" val="1"/>
+            </a:ext>
+          </a:extLst>
+        </p:spPr>
+        <p:txBody>
+          <a:bodyPr/>
+          <a:lstStyle/>
+          <a:p>
+            <a:pPr lvl="0">
+              <a:defRPr sz="1800" i="0">
+                <a:solidFill>
+                  <a:srgbClr val="000000"/>
+                </a:solidFill>
+              </a:defRPr>
+            </a:pPr>
+            <a:fld id="{86CB4B4D-7CA3-9044-876B-883B54F8677D}" type="slidenum">
+              <a:rPr sz="1100" i="1">
+                <a:solidFill>
+                  <a:srgbClr val="929396"/>
+                </a:solidFill>
+              </a:rPr>
+              <a:t>15</a:t>
+            </a:fld>
+            <a:endParaRPr sz="1100" i="1">
+              <a:solidFill>
+                <a:srgbClr val="929396"/>
+              </a:solidFill>
+            </a:endParaRPr>
+          </a:p>
+        </p:txBody>
+      </p:sp>
+    </p:spTree>
+    <p:extLst>
+      <p:ext uri="{BB962C8B-B14F-4D97-AF65-F5344CB8AC3E}">
+        <p14:creationId xmlns:p14="http://schemas.microsoft.com/office/powerpoint/2010/main" val="950846044"/>
       </p:ext>
     </p:extLst>
   </p:cSld>
@@ -15502,6 +16559,79 @@
               </a:rPr>
               <a:t>的热部署特性</a:t>
             </a:r>
+            <a:endParaRPr lang="en-US" altLang="zh-CN" sz="2000" dirty="0" smtClean="0">
+              <a:solidFill>
+                <a:srgbClr val="00B56E"/>
+              </a:solidFill>
+            </a:endParaRPr>
+          </a:p>
+          <a:p>
+            <a:pPr>
+              <a:defRPr sz="1800"/>
+            </a:pPr>
+            <a:r>
+              <a:rPr lang="en-US" altLang="zh-TW" sz="2000" dirty="0">
+                <a:solidFill>
+                  <a:srgbClr val="00B56E"/>
+                </a:solidFill>
+              </a:rPr>
+              <a:t>•    </a:t>
+            </a:r>
+            <a:r>
+              <a:rPr lang="zh-CN" altLang="en-US" sz="2000" dirty="0" smtClean="0">
+                <a:solidFill>
+                  <a:srgbClr val="00B56E"/>
+                </a:solidFill>
+                <a:hlinkClick r:id="rId10" action="ppaction://hlinksldjump"/>
+              </a:rPr>
+              <a:t>验证</a:t>
+            </a:r>
+            <a:r>
+              <a:rPr lang="en-US" altLang="zh-CN" sz="2000" dirty="0" smtClean="0">
+                <a:solidFill>
+                  <a:srgbClr val="00B56E"/>
+                </a:solidFill>
+                <a:hlinkClick r:id="rId10" action="ppaction://hlinksldjump"/>
+              </a:rPr>
+              <a:t>workflow</a:t>
+            </a:r>
+            <a:r>
+              <a:rPr lang="zh-CN" altLang="en-US" sz="2000" dirty="0" smtClean="0">
+                <a:solidFill>
+                  <a:srgbClr val="00B56E"/>
+                </a:solidFill>
+                <a:hlinkClick r:id="rId10" action="ppaction://hlinksldjump"/>
+              </a:rPr>
+              <a:t>的</a:t>
+            </a:r>
+            <a:r>
+              <a:rPr lang="en-US" altLang="zh-CN" sz="2000" dirty="0" smtClean="0">
+                <a:solidFill>
+                  <a:srgbClr val="00B56E"/>
+                </a:solidFill>
+                <a:hlinkClick r:id="rId10" action="ppaction://hlinksldjump"/>
+              </a:rPr>
+              <a:t>XML</a:t>
+            </a:r>
+            <a:r>
+              <a:rPr lang="zh-CN" altLang="en-US" sz="2000" dirty="0" smtClean="0">
+                <a:solidFill>
+                  <a:srgbClr val="00B56E"/>
+                </a:solidFill>
+                <a:hlinkClick r:id="rId10" action="ppaction://hlinksldjump"/>
+              </a:rPr>
+              <a:t>文件</a:t>
+            </a:r>
+            <a:endParaRPr lang="en-US" altLang="zh-CN" sz="2000" dirty="0">
+              <a:solidFill>
+                <a:srgbClr val="00B56E"/>
+              </a:solidFill>
+            </a:endParaRPr>
+          </a:p>
+          <a:p>
+            <a:pPr>
+              <a:defRPr sz="1800"/>
+            </a:pPr>
             <a:endParaRPr lang="zh-TW" altLang="en-US" sz="2000" dirty="0">
               <a:solidFill>
                 <a:srgbClr val="00B56E"/>
@@ -17457,7 +18587,7 @@
         </p:nvSpPr>
         <p:spPr>
           <a:xfrm>
-            <a:off x="330593" y="1151890"/>
+            <a:off x="339523" y="1295999"/>
             <a:ext cx="12230103" cy="8161021"/>
           </a:xfrm>
           <a:prstGeom prst="rect">
@@ -17482,7 +18612,7 @@
               <a:defRPr sz="1800" i="0"/>
             </a:pPr>
             <a:r>
-              <a:rPr sz="1600" i="1"/>
+              <a:rPr sz="1600" i="1" dirty="0"/>
               <a:t>&lt;action name="sqoopIncrImport"&gt;</a:t>
             </a:r>
           </a:p>
@@ -17491,7 +18621,7 @@
               <a:defRPr sz="1800" i="0"/>
             </a:pPr>
             <a:r>
-              <a:rPr sz="1600" i="1"/>
+              <a:rPr sz="1600" i="1" dirty="0"/>
               <a:t>        &lt;sqoop xmlns="uri:oozie:sqoop-action:0.2"&gt;</a:t>
             </a:r>
           </a:p>
@@ -17500,7 +18630,7 @@
               <a:defRPr sz="1800" i="0"/>
             </a:pPr>
             <a:r>
-              <a:rPr sz="1600" i="1"/>
+              <a:rPr sz="1600" i="1" dirty="0"/>
               <a:t>           &lt;job-tracker&gt;${jobTracker}&lt;/job-tracker&gt;</a:t>
             </a:r>
           </a:p>
@@ -17509,7 +18639,7 @@
               <a:defRPr sz="1800" i="0"/>
             </a:pPr>
             <a:r>
-              <a:rPr sz="1600" i="1"/>
+              <a:rPr sz="1600" i="1" dirty="0"/>
               <a:t>           &lt;name-node&gt;${nameNode}&lt;/name-node&gt;</a:t>
             </a:r>
           </a:p>
@@ -17518,7 +18648,7 @@
               <a:defRPr sz="1800" i="0"/>
             </a:pPr>
             <a:r>
-              <a:rPr sz="1600" i="1"/>
+              <a:rPr sz="1600" i="1" dirty="0"/>
               <a:t>           &lt;prepare&gt;</a:t>
             </a:r>
           </a:p>
@@ -17527,7 +18657,7 @@
               <a:defRPr sz="1800" i="0"/>
             </a:pPr>
             <a:r>
-              <a:rPr sz="1600" i="1"/>
+              <a:rPr sz="1600" i="1" dirty="0"/>
               <a:t>               &lt;delete path="${s3BucketLoc}/${tableName}/incr"/&gt;</a:t>
             </a:r>
           </a:p>
@@ -17536,7 +18666,7 @@
               <a:defRPr sz="1800" i="0"/>
             </a:pPr>
             <a:r>
-              <a:rPr sz="1600" i="1"/>
+              <a:rPr sz="1600" i="1" dirty="0"/>
               <a:t>               &lt;mkdir path="${s3BucketLoc}/${tableName}"/&gt;</a:t>
             </a:r>
           </a:p>
@@ -17545,7 +18675,7 @@
               <a:defRPr sz="1800" i="0"/>
             </a:pPr>
             <a:r>
-              <a:rPr sz="1600" i="1"/>
+              <a:rPr sz="1600" i="1" dirty="0"/>
               <a:t>           &lt;/prepare&gt;</a:t>
             </a:r>
           </a:p>
@@ -17554,7 +18684,7 @@
               <a:defRPr sz="1800" i="0"/>
             </a:pPr>
             <a:r>
-              <a:rPr sz="1600" i="1"/>
+              <a:rPr sz="1600" i="1" dirty="0"/>
               <a:t>           &lt;configuration&gt;</a:t>
             </a:r>
           </a:p>
@@ -17563,7 +18693,7 @@
               <a:defRPr sz="1800" i="0"/>
             </a:pPr>
             <a:r>
-              <a:rPr sz="1600" i="1"/>
+              <a:rPr sz="1600" i="1" dirty="0"/>
               <a:t>               &lt;property&gt;</a:t>
             </a:r>
           </a:p>
@@ -17572,7 +18702,7 @@
               <a:defRPr sz="1800" i="0"/>
             </a:pPr>
             <a:r>
-              <a:rPr sz="1600" i="1"/>
+              <a:rPr sz="1600" i="1" dirty="0"/>
               <a:t>                   &lt;name&gt;mapred.job.queue.name&lt;/name&gt;</a:t>
             </a:r>
           </a:p>
@@ -17581,7 +18711,7 @@
               <a:defRPr sz="1800" i="0"/>
             </a:pPr>
             <a:r>
-              <a:rPr sz="1600" i="1"/>
+              <a:rPr sz="1600" i="1" dirty="0"/>
               <a:t>                   &lt;value&gt;${queueName}&lt;/value&gt;</a:t>
             </a:r>
           </a:p>
@@ -17590,7 +18720,7 @@
               <a:defRPr sz="1800" i="0"/>
             </a:pPr>
             <a:r>
-              <a:rPr sz="1600" i="1"/>
+              <a:rPr sz="1600" i="1" dirty="0"/>
               <a:t>               &lt;/property&gt;</a:t>
             </a:r>
           </a:p>
@@ -17599,7 +18729,7 @@
               <a:defRPr sz="1800" i="0"/>
             </a:pPr>
             <a:r>
-              <a:rPr sz="1600" i="1"/>
+              <a:rPr sz="1600" i="1" dirty="0"/>
               <a:t>           &lt;/configuration&gt;</a:t>
             </a:r>
           </a:p>
@@ -17608,7 +18738,7 @@
               <a:defRPr sz="1800" i="0"/>
             </a:pPr>
             <a:r>
-              <a:rPr sz="1600" i="1"/>
+              <a:rPr sz="1600" i="1" dirty="0"/>
               <a:t>           &lt;arg&gt;import&lt;/arg&gt;</a:t>
             </a:r>
           </a:p>
@@ -17617,7 +18747,7 @@
               <a:defRPr sz="1800" i="0"/>
             </a:pPr>
             <a:r>
-              <a:rPr sz="1600" i="1"/>
+              <a:rPr sz="1600" i="1" dirty="0"/>
               <a:t>           &lt;arg&gt;--connect&lt;/arg&gt;</a:t>
             </a:r>
           </a:p>
@@ -17626,7 +18756,7 @@
               <a:defRPr sz="1800" i="0"/>
             </a:pPr>
             <a:r>
-              <a:rPr sz="1600" i="1"/>
+              <a:rPr sz="1600" i="1" dirty="0"/>
               <a:t>           &lt;arg&gt;${dbURL}&lt;/arg&gt;</a:t>
             </a:r>
           </a:p>
@@ -17635,7 +18765,7 @@
               <a:defRPr sz="1800" i="0"/>
             </a:pPr>
             <a:r>
-              <a:rPr sz="1600" i="1"/>
+              <a:rPr sz="1600" i="1" dirty="0"/>
               <a:t>           &lt;arg&gt;--driver&lt;/arg&gt;</a:t>
             </a:r>
           </a:p>
@@ -17644,7 +18774,7 @@
               <a:defRPr sz="1800" i="0"/>
             </a:pPr>
             <a:r>
-              <a:rPr sz="1600" i="1"/>
+              <a:rPr sz="1600" i="1" dirty="0"/>
               <a:t>           &lt;arg&gt;${mySqlDriver}&lt;/arg&gt;</a:t>
             </a:r>
           </a:p>
@@ -17653,7 +18783,7 @@
               <a:defRPr sz="1800" i="0"/>
             </a:pPr>
             <a:r>
-              <a:rPr sz="1600" i="1"/>
+              <a:rPr sz="1600" i="1" dirty="0"/>
               <a:t>           &lt;arg&gt;--username&lt;/arg&gt;</a:t>
             </a:r>
           </a:p>
@@ -17662,7 +18792,7 @@
               <a:defRPr sz="1800" i="0"/>
             </a:pPr>
             <a:r>
-              <a:rPr sz="1600" i="1"/>
+              <a:rPr sz="1600" i="1" dirty="0"/>
               <a:t>           &lt;arg&gt;${user}&lt;/arg&gt;</a:t>
             </a:r>
           </a:p>
@@ -17671,7 +18801,7 @@
               <a:defRPr sz="1800" i="0"/>
             </a:pPr>
             <a:r>
-              <a:rPr sz="1600" i="1"/>
+              <a:rPr sz="1600" i="1" dirty="0"/>
               <a:t>           &lt;arg&gt;--table&lt;/arg&gt;</a:t>
             </a:r>
           </a:p>
@@ -17680,11 +18810,11 @@
               <a:defRPr sz="1800" i="0"/>
             </a:pPr>
             <a:r>
-              <a:rPr sz="1600" i="1"/>
+              <a:rPr sz="1600" i="1" dirty="0"/>
               <a:t>          </a:t>
             </a:r>
             <a:r>
-              <a:rPr sz="1600" i="1">
+              <a:rPr sz="1600" i="1" dirty="0">
                 <a:solidFill>
                   <a:srgbClr val="00B56E"/>
                 </a:solidFill>
@@ -17697,7 +18827,7 @@
               <a:defRPr sz="1800" i="0"/>
             </a:pPr>
             <a:r>
-              <a:rPr sz="1600" i="1"/>
+              <a:rPr sz="1600" i="1" dirty="0"/>
               <a:t>           &lt;arg&gt;--target-dir&lt;/arg&gt;</a:t>
             </a:r>
           </a:p>
@@ -17706,7 +18836,7 @@
               <a:defRPr sz="1800" i="0"/>
             </a:pPr>
             <a:r>
-              <a:rPr sz="1600" i="1"/>
+              <a:rPr sz="1600" i="1" dirty="0"/>
               <a:t>           &lt;arg&gt;${s3BucketLoc}/${tableName}/incr&lt;/arg&gt;</a:t>
             </a:r>
           </a:p>
@@ -17715,7 +18845,7 @@
               <a:defRPr sz="1800" i="0"/>
             </a:pPr>
             <a:r>
-              <a:rPr sz="1600" i="1"/>
+              <a:rPr sz="1600" i="1" dirty="0"/>
               <a:t>           &lt;arg&gt;--check-column&lt;/arg&gt;</a:t>
             </a:r>
           </a:p>
@@ -17724,7 +18854,7 @@
               <a:defRPr sz="1800" i="0"/>
             </a:pPr>
             <a:r>
-              <a:rPr sz="1600" i="1"/>
+              <a:rPr sz="1600" i="1" dirty="0"/>
               <a:t>           &lt;arg&gt;LAST_UPD&lt;/arg&gt;</a:t>
             </a:r>
           </a:p>
@@ -17733,7 +18863,7 @@
               <a:defRPr sz="1800" i="0"/>
             </a:pPr>
             <a:r>
-              <a:rPr sz="1600" i="1"/>
+              <a:rPr sz="1600" i="1" dirty="0"/>
               <a:t>           &lt;arg&gt;--incremental&lt;/arg&gt;</a:t>
             </a:r>
           </a:p>
@@ -17742,7 +18872,7 @@
               <a:defRPr sz="1800" i="0"/>
             </a:pPr>
             <a:r>
-              <a:rPr sz="1600" i="1"/>
+              <a:rPr sz="1600" i="1" dirty="0"/>
               <a:t>           &lt;arg&gt;lastmodified&lt;/arg&gt;</a:t>
             </a:r>
           </a:p>
@@ -17751,7 +18881,7 @@
               <a:defRPr sz="1800" i="0"/>
             </a:pPr>
             <a:r>
-              <a:rPr sz="1600" i="1"/>
+              <a:rPr sz="1600" i="1" dirty="0"/>
               <a:t>           &lt;arg&gt;--last-value&lt;/arg&gt;</a:t>
             </a:r>
           </a:p>
@@ -17760,25 +18890,25 @@
               <a:defRPr sz="1800" i="0"/>
             </a:pPr>
             <a:r>
-              <a:rPr sz="1600" i="1"/>
+              <a:rPr sz="1600" i="1" dirty="0"/>
               <a:t>         </a:t>
             </a:r>
             <a:r>
-              <a:rPr sz="1600" i="1">
+              <a:rPr sz="1600" i="1" dirty="0">
                 <a:solidFill>
                   <a:srgbClr val="00B56E"/>
                 </a:solidFill>
               </a:rPr>
               <a:t>  &lt;arg&gt;${wf:actionData('timeCheck')['sqoopLstUpd']}&lt;/arg&gt;</a:t>
             </a:r>
-            <a:endParaRPr sz="1600" i="1"/>
+            <a:endParaRPr sz="1600" i="1" dirty="0"/>
           </a:p>
           <a:p>
             <a:pPr lvl="0" algn="l">
               <a:defRPr sz="1800" i="0"/>
             </a:pPr>
             <a:r>
-              <a:rPr sz="1600" i="1"/>
+              <a:rPr sz="1600" i="1" dirty="0"/>
               <a:t>           &lt;arg&gt;--m&lt;/arg&gt;</a:t>
             </a:r>
           </a:p>
@@ -17787,7 +18917,7 @@
               <a:defRPr sz="1800" i="0"/>
             </a:pPr>
             <a:r>
-              <a:rPr sz="1600" i="1"/>
+              <a:rPr sz="1600" i="1" dirty="0"/>
               <a:t>           &lt;arg&gt;1&lt;/arg&gt;</a:t>
             </a:r>
           </a:p>
@@ -17796,7 +18926,7 @@
               <a:defRPr sz="1800" i="0"/>
             </a:pPr>
             <a:r>
-              <a:rPr sz="1600" i="1"/>
+              <a:rPr sz="1600" i="1" dirty="0"/>
               <a:t>       &lt;/sqoop&gt;</a:t>
             </a:r>
           </a:p>
@@ -17805,7 +18935,7 @@
               <a:defRPr sz="1800" i="0"/>
             </a:pPr>
             <a:r>
-              <a:rPr sz="1600" i="1"/>
+              <a:rPr sz="1600" i="1" dirty="0"/>
               <a:t>       &lt;ok to="sqoopMetaUpdate"/&gt;</a:t>
             </a:r>
           </a:p>
@@ -17814,7 +18944,7 @@
               <a:defRPr sz="1800" i="0"/>
             </a:pPr>
             <a:r>
-              <a:rPr sz="1600" i="1"/>
+              <a:rPr sz="1600" i="1" dirty="0"/>
               <a:t>       &lt;error to="fail"/&gt;</a:t>
             </a:r>
           </a:p>
@@ -17823,7 +18953,7 @@
               <a:defRPr sz="1800" i="0"/>
             </a:pPr>
             <a:r>
-              <a:rPr sz="1600" i="1"/>
+              <a:rPr sz="1600" i="1" dirty="0"/>
               <a:t>   &lt;/action&gt;</a:t>
             </a:r>
           </a:p>
@@ -18074,7 +19204,7 @@
         </p:nvSpPr>
         <p:spPr>
           <a:xfrm>
-            <a:off x="297504" y="6337299"/>
+            <a:off x="297504" y="6561413"/>
             <a:ext cx="12482166" cy="2184401"/>
           </a:xfrm>
           <a:prstGeom prst="rect">
@@ -18105,7 +19235,7 @@
               <a:defRPr sz="1800" i="0"/>
             </a:pPr>
             <a:r>
-              <a:rPr sz="1700">
+              <a:rPr sz="1700" dirty="0">
                 <a:latin typeface="+mn-lt"/>
                 <a:ea typeface="+mn-ea"/>
                 <a:cs typeface="+mn-cs"/>
@@ -18125,7 +19255,7 @@
               <a:defRPr sz="1800" i="0"/>
             </a:pPr>
             <a:r>
-              <a:rPr sz="1700">
+              <a:rPr sz="1700" dirty="0">
                 <a:latin typeface="+mn-lt"/>
                 <a:ea typeface="+mn-ea"/>
                 <a:cs typeface="+mn-cs"/>
@@ -18145,7 +19275,7 @@
               <a:defRPr sz="1800" i="0"/>
             </a:pPr>
             <a:r>
-              <a:rPr sz="1700">
+              <a:rPr sz="1700" dirty="0">
                 <a:latin typeface="+mn-lt"/>
                 <a:ea typeface="+mn-ea"/>
                 <a:cs typeface="+mn-cs"/>
@@ -18165,7 +19295,7 @@
               <a:defRPr sz="1800" i="0"/>
             </a:pPr>
             <a:r>
-              <a:rPr sz="1700">
+              <a:rPr sz="1700" dirty="0">
                 <a:latin typeface="+mn-lt"/>
                 <a:ea typeface="+mn-ea"/>
                 <a:cs typeface="+mn-cs"/>

</xml_diff>